<commit_message>
updated slides to include movies + rearranging hydra slides
</commit_message>
<xml_diff>
--- a/papers/koningterry/slides.pptx
+++ b/papers/koningterry/slides.pptx
@@ -6,36 +6,38 @@
     <p:sldMasterId id="2147485039" r:id="rId2"/>
   </p:sldMasterIdLst>
   <p:notesMasterIdLst>
-    <p:notesMasterId r:id="rId27"/>
+    <p:notesMasterId r:id="rId29"/>
   </p:notesMasterIdLst>
   <p:handoutMasterIdLst>
-    <p:handoutMasterId r:id="rId28"/>
+    <p:handoutMasterId r:id="rId30"/>
   </p:handoutMasterIdLst>
   <p:sldIdLst>
     <p:sldId id="496" r:id="rId3"/>
     <p:sldId id="500" r:id="rId4"/>
     <p:sldId id="516" r:id="rId5"/>
-    <p:sldId id="517" r:id="rId6"/>
-    <p:sldId id="518" r:id="rId7"/>
-    <p:sldId id="519" r:id="rId8"/>
-    <p:sldId id="531" r:id="rId9"/>
+    <p:sldId id="532" r:id="rId6"/>
+    <p:sldId id="517" r:id="rId7"/>
+    <p:sldId id="518" r:id="rId8"/>
+    <p:sldId id="519" r:id="rId9"/>
     <p:sldId id="520" r:id="rId10"/>
-    <p:sldId id="521" r:id="rId11"/>
-    <p:sldId id="509" r:id="rId12"/>
-    <p:sldId id="501" r:id="rId13"/>
-    <p:sldId id="526" r:id="rId14"/>
-    <p:sldId id="527" r:id="rId15"/>
-    <p:sldId id="528" r:id="rId16"/>
-    <p:sldId id="530" r:id="rId17"/>
-    <p:sldId id="522" r:id="rId18"/>
-    <p:sldId id="504" r:id="rId19"/>
-    <p:sldId id="508" r:id="rId20"/>
-    <p:sldId id="510" r:id="rId21"/>
-    <p:sldId id="523" r:id="rId22"/>
-    <p:sldId id="524" r:id="rId23"/>
-    <p:sldId id="525" r:id="rId24"/>
-    <p:sldId id="512" r:id="rId25"/>
-    <p:sldId id="506" r:id="rId26"/>
+    <p:sldId id="531" r:id="rId11"/>
+    <p:sldId id="523" r:id="rId12"/>
+    <p:sldId id="524" r:id="rId13"/>
+    <p:sldId id="521" r:id="rId14"/>
+    <p:sldId id="509" r:id="rId15"/>
+    <p:sldId id="533" r:id="rId16"/>
+    <p:sldId id="501" r:id="rId17"/>
+    <p:sldId id="526" r:id="rId18"/>
+    <p:sldId id="527" r:id="rId19"/>
+    <p:sldId id="528" r:id="rId20"/>
+    <p:sldId id="530" r:id="rId21"/>
+    <p:sldId id="522" r:id="rId22"/>
+    <p:sldId id="504" r:id="rId23"/>
+    <p:sldId id="508" r:id="rId24"/>
+    <p:sldId id="510" r:id="rId25"/>
+    <p:sldId id="525" r:id="rId26"/>
+    <p:sldId id="512" r:id="rId27"/>
+    <p:sldId id="506" r:id="rId28"/>
   </p:sldIdLst>
   <p:sldSz cx="9144000" cy="6858000" type="screen4x3"/>
   <p:notesSz cx="6858000" cy="9144000"/>
@@ -4405,6 +4407,443 @@
           <a:p>
             <a:r>
               <a:rPr lang="en-US" dirty="0" smtClean="0"/>
+              <a:t>Python is both extended by and embedded in Hydra</a:t>
+            </a:r>
+            <a:endParaRPr lang="en-US" dirty="0"/>
+          </a:p>
+        </p:txBody>
+      </p:sp>
+      <p:sp>
+        <p:nvSpPr>
+          <p:cNvPr id="3" name="Content Placeholder 2"/>
+          <p:cNvSpPr>
+            <a:spLocks noGrp="1"/>
+          </p:cNvSpPr>
+          <p:nvPr>
+            <p:ph idx="1"/>
+          </p:nvPr>
+        </p:nvSpPr>
+        <p:spPr/>
+        <p:txBody>
+          <a:bodyPr/>
+          <a:lstStyle/>
+          <a:p>
+            <a:r>
+              <a:rPr lang="en-US" sz="2000" dirty="0" smtClean="0"/>
+              <a:t>Python is extended through a module called “hydra” which contains functions and objects to manipulate hydra data structures</a:t>
+            </a:r>
+          </a:p>
+          <a:p>
+            <a:endParaRPr lang="en-US" sz="2000" dirty="0" smtClean="0"/>
+          </a:p>
+          <a:p>
+            <a:r>
+              <a:rPr lang="en-US" sz="2000" dirty="0" smtClean="0"/>
+              <a:t>Python is then embedded in the hydra executable</a:t>
+            </a:r>
+          </a:p>
+          <a:p>
+            <a:endParaRPr lang="en-US" sz="2000" dirty="0" smtClean="0"/>
+          </a:p>
+          <a:p>
+            <a:r>
+              <a:rPr lang="en-US" sz="2000" dirty="0" smtClean="0"/>
+              <a:t>Bottom line: Hydra makes available a Python interpreter running concurrently in parallel with the main Hydra executable.  The two processes are loosely coupled through the “hydra” Python module</a:t>
+            </a:r>
+          </a:p>
+        </p:txBody>
+      </p:sp>
+    </p:spTree>
+  </p:cSld>
+  <p:clrMapOvr>
+    <a:masterClrMapping/>
+  </p:clrMapOvr>
+</p:sld>
+</file>
+
+<file path=ppt/slides/slide11.xml><?xml version="1.0" encoding="utf-8"?>
+<p:sld xmlns:a="http://schemas.openxmlformats.org/drawingml/2006/main" xmlns:r="http://schemas.openxmlformats.org/officeDocument/2006/relationships" xmlns:mc="http://schemas.openxmlformats.org/markup-compatibility/2006" xmlns:mv="urn:schemas-microsoft-com:mac:vml" xmlns:p="http://schemas.openxmlformats.org/presentationml/2006/main" mc:Ignorable="mv" mc:PreserveAttributes="mv:*">
+  <p:cSld>
+    <p:spTree>
+      <p:nvGrpSpPr>
+        <p:cNvPr id="1" name=""/>
+        <p:cNvGrpSpPr/>
+        <p:nvPr/>
+      </p:nvGrpSpPr>
+      <p:grpSpPr>
+        <a:xfrm>
+          <a:off x="0" y="0"/>
+          <a:ext cx="0" cy="0"/>
+          <a:chOff x="0" y="0"/>
+          <a:chExt cx="0" cy="0"/>
+        </a:xfrm>
+      </p:grpSpPr>
+      <p:sp>
+        <p:nvSpPr>
+          <p:cNvPr id="2" name="Title 1"/>
+          <p:cNvSpPr>
+            <a:spLocks noGrp="1"/>
+          </p:cNvSpPr>
+          <p:nvPr>
+            <p:ph type="title"/>
+          </p:nvPr>
+        </p:nvSpPr>
+        <p:spPr/>
+        <p:txBody>
+          <a:bodyPr/>
+          <a:lstStyle/>
+          <a:p>
+            <a:r>
+              <a:rPr lang="en-US" dirty="0" smtClean="0"/>
+              <a:t>Interesting lessons learned</a:t>
+            </a:r>
+            <a:endParaRPr lang="en-US" dirty="0"/>
+          </a:p>
+        </p:txBody>
+      </p:sp>
+      <p:sp>
+        <p:nvSpPr>
+          <p:cNvPr id="3" name="Content Placeholder 2"/>
+          <p:cNvSpPr>
+            <a:spLocks noGrp="1"/>
+          </p:cNvSpPr>
+          <p:nvPr>
+            <p:ph idx="1"/>
+          </p:nvPr>
+        </p:nvSpPr>
+        <p:spPr>
+          <a:xfrm>
+            <a:off x="212725" y="1401379"/>
+            <a:ext cx="8778875" cy="4885121"/>
+          </a:xfrm>
+        </p:spPr>
+        <p:txBody>
+          <a:bodyPr/>
+          <a:lstStyle/>
+          <a:p>
+            <a:r>
+              <a:rPr lang="en-US" dirty="0" smtClean="0"/>
+              <a:t>Propagating modifications to the parser is </a:t>
+            </a:r>
+            <a:r>
+              <a:rPr lang="en-US" dirty="0" smtClean="0"/>
+              <a:t>tricky</a:t>
+            </a:r>
+          </a:p>
+          <a:p>
+            <a:pPr lvl="1"/>
+            <a:r>
+              <a:rPr lang="en-US" dirty="0" smtClean="0"/>
+              <a:t>Need a custom parser</a:t>
+            </a:r>
+            <a:endParaRPr lang="en-US" dirty="0" smtClean="0"/>
+          </a:p>
+          <a:p>
+            <a:pPr lvl="1"/>
+            <a:r>
+              <a:rPr lang="en-US" dirty="0" smtClean="0">
+                <a:latin typeface="Inconsolata"/>
+                <a:cs typeface="Inconsolata"/>
+              </a:rPr>
+              <a:t>from __future__ import </a:t>
+            </a:r>
+            <a:r>
+              <a:rPr lang="en-US" dirty="0" err="1" smtClean="0">
+                <a:latin typeface="Inconsolata"/>
+                <a:cs typeface="Inconsolata"/>
+              </a:rPr>
+              <a:t>with_statement</a:t>
+            </a:r>
+            <a:endParaRPr lang="en-US" dirty="0" smtClean="0">
+              <a:latin typeface="Inconsolata"/>
+              <a:cs typeface="Inconsolata"/>
+            </a:endParaRPr>
+          </a:p>
+          <a:p>
+            <a:pPr>
+              <a:buNone/>
+            </a:pPr>
+            <a:endParaRPr lang="en-US" dirty="0" smtClean="0"/>
+          </a:p>
+          <a:p>
+            <a:r>
+              <a:rPr lang="en-US" dirty="0" smtClean="0"/>
+              <a:t>Saving the state of </a:t>
+            </a:r>
+            <a:r>
+              <a:rPr lang="en-US" dirty="0" smtClean="0">
+                <a:latin typeface="Inconsolata"/>
+                <a:cs typeface="Inconsolata"/>
+              </a:rPr>
+              <a:t>__main__</a:t>
+            </a:r>
+            <a:r>
+              <a:rPr lang="en-US" dirty="0" smtClean="0"/>
+              <a:t> across restarts is tricky</a:t>
+            </a:r>
+          </a:p>
+          <a:p>
+            <a:pPr lvl="1"/>
+            <a:r>
+              <a:rPr lang="en-US" dirty="0" smtClean="0"/>
+              <a:t>Cobble together many methods to collect state</a:t>
+            </a:r>
+          </a:p>
+          <a:p>
+            <a:pPr lvl="1"/>
+            <a:r>
+              <a:rPr lang="en-US" dirty="0" smtClean="0"/>
+              <a:t>Pickle state as a string and add it to restart files</a:t>
+            </a:r>
+          </a:p>
+          <a:p>
+            <a:pPr lvl="1"/>
+            <a:r>
+              <a:rPr lang="en-US" dirty="0" smtClean="0"/>
+              <a:t>Some objects pickle but do not </a:t>
+            </a:r>
+            <a:r>
+              <a:rPr lang="en-US" dirty="0" err="1" smtClean="0"/>
+              <a:t>unpickle</a:t>
+            </a:r>
+            <a:r>
+              <a:rPr lang="en-US" dirty="0" smtClean="0"/>
+              <a:t>!</a:t>
+            </a:r>
+          </a:p>
+          <a:p>
+            <a:pPr lvl="1"/>
+            <a:endParaRPr lang="en-US" dirty="0" smtClean="0"/>
+          </a:p>
+          <a:p>
+            <a:r>
+              <a:rPr lang="en-US" dirty="0" smtClean="0"/>
+              <a:t>If your program uses different indexing than Python, resist the urge to emulate your program’s indexing in Python</a:t>
+            </a:r>
+          </a:p>
+        </p:txBody>
+      </p:sp>
+    </p:spTree>
+  </p:cSld>
+  <p:clrMapOvr>
+    <a:masterClrMapping/>
+  </p:clrMapOvr>
+</p:sld>
+</file>
+
+<file path=ppt/slides/slide12.xml><?xml version="1.0" encoding="utf-8"?>
+<p:sld xmlns:a="http://schemas.openxmlformats.org/drawingml/2006/main" xmlns:r="http://schemas.openxmlformats.org/officeDocument/2006/relationships" xmlns:mc="http://schemas.openxmlformats.org/markup-compatibility/2006" xmlns:mv="urn:schemas-microsoft-com:mac:vml" xmlns:p="http://schemas.openxmlformats.org/presentationml/2006/main" mc:Ignorable="mv" mc:PreserveAttributes="mv:*">
+  <p:cSld>
+    <p:spTree>
+      <p:nvGrpSpPr>
+        <p:cNvPr id="1" name=""/>
+        <p:cNvGrpSpPr/>
+        <p:nvPr/>
+      </p:nvGrpSpPr>
+      <p:grpSpPr>
+        <a:xfrm>
+          <a:off x="0" y="0"/>
+          <a:ext cx="0" cy="0"/>
+          <a:chOff x="0" y="0"/>
+          <a:chExt cx="0" cy="0"/>
+        </a:xfrm>
+      </p:grpSpPr>
+      <p:sp>
+        <p:nvSpPr>
+          <p:cNvPr id="2" name="Title 1"/>
+          <p:cNvSpPr>
+            <a:spLocks noGrp="1"/>
+          </p:cNvSpPr>
+          <p:nvPr>
+            <p:ph type="title"/>
+          </p:nvPr>
+        </p:nvSpPr>
+        <p:spPr/>
+        <p:txBody>
+          <a:bodyPr/>
+          <a:lstStyle/>
+          <a:p>
+            <a:r>
+              <a:rPr lang="en-US" dirty="0" smtClean="0"/>
+              <a:t>Auto-tuner needs to generate, run and process many </a:t>
+            </a:r>
+            <a:r>
+              <a:rPr lang="en-US" dirty="0" err="1" smtClean="0"/>
+              <a:t>simultions</a:t>
+            </a:r>
+            <a:endParaRPr lang="en-US" dirty="0"/>
+          </a:p>
+        </p:txBody>
+      </p:sp>
+      <p:sp>
+        <p:nvSpPr>
+          <p:cNvPr id="3" name="Content Placeholder 2"/>
+          <p:cNvSpPr>
+            <a:spLocks noGrp="1"/>
+          </p:cNvSpPr>
+          <p:nvPr>
+            <p:ph idx="1"/>
+          </p:nvPr>
+        </p:nvSpPr>
+        <p:spPr>
+          <a:xfrm>
+            <a:off x="212725" y="1231719"/>
+            <a:ext cx="8778875" cy="5054781"/>
+          </a:xfrm>
+        </p:spPr>
+        <p:txBody>
+          <a:bodyPr/>
+          <a:lstStyle/>
+          <a:p>
+            <a:r>
+              <a:rPr lang="en-US" dirty="0" smtClean="0"/>
+              <a:t>Input file generators that wrap a “template” input file</a:t>
+            </a:r>
+          </a:p>
+          <a:p>
+            <a:pPr lvl="1"/>
+            <a:r>
+              <a:rPr lang="en-US" dirty="0" smtClean="0"/>
+              <a:t>Modify simple Hydra variable assignments</a:t>
+            </a:r>
+          </a:p>
+          <a:p>
+            <a:pPr lvl="1"/>
+            <a:r>
+              <a:rPr lang="en-US" dirty="0" smtClean="0"/>
+              <a:t>Delegate complicated input file structures to special purpose objects</a:t>
+            </a:r>
+          </a:p>
+          <a:p>
+            <a:pPr lvl="1"/>
+            <a:r>
+              <a:rPr lang="en-US" dirty="0" smtClean="0"/>
+              <a:t>Inject commands into the input file by </a:t>
+            </a:r>
+            <a:r>
+              <a:rPr lang="en-US" dirty="0" err="1" smtClean="0"/>
+              <a:t>overwritings</a:t>
+            </a:r>
+            <a:r>
+              <a:rPr lang="en-US" dirty="0" smtClean="0"/>
+              <a:t> sentinels with </a:t>
+            </a:r>
+            <a:br>
+              <a:rPr lang="en-US" dirty="0" smtClean="0"/>
+            </a:br>
+            <a:r>
+              <a:rPr lang="en-US" dirty="0" smtClean="0">
+                <a:latin typeface="Inconsolata"/>
+                <a:cs typeface="Inconsolata"/>
+              </a:rPr>
+              <a:t>	</a:t>
+            </a:r>
+            <a:r>
+              <a:rPr lang="en-US" dirty="0" err="1" smtClean="0">
+                <a:latin typeface="Inconsolata"/>
+                <a:cs typeface="Inconsolata"/>
+              </a:rPr>
+              <a:t>str(python_proxy_of_complicated_thing</a:t>
+            </a:r>
+            <a:r>
+              <a:rPr lang="en-US" dirty="0" smtClean="0">
+                <a:latin typeface="Inconsolata"/>
+                <a:cs typeface="Inconsolata"/>
+              </a:rPr>
+              <a:t>)</a:t>
+            </a:r>
+          </a:p>
+          <a:p>
+            <a:pPr lvl="1"/>
+            <a:endParaRPr lang="en-US" dirty="0" smtClean="0"/>
+          </a:p>
+          <a:p>
+            <a:r>
+              <a:rPr lang="en-US" dirty="0" smtClean="0"/>
+              <a:t>Output file wrappers extract data from Hydra binary output files</a:t>
+            </a:r>
+          </a:p>
+          <a:p>
+            <a:endParaRPr lang="en-US" dirty="0" smtClean="0"/>
+          </a:p>
+          <a:p>
+            <a:r>
+              <a:rPr lang="en-US" dirty="0" smtClean="0"/>
+              <a:t>Embedded diagnostics using embedded Python interpreter</a:t>
+            </a:r>
+          </a:p>
+          <a:p>
+            <a:pPr lvl="1"/>
+            <a:r>
+              <a:rPr lang="en-US" dirty="0" smtClean="0"/>
+              <a:t>Characteristic (shock) trackers with finish line triggers</a:t>
+            </a:r>
+          </a:p>
+          <a:p>
+            <a:pPr lvl="1"/>
+            <a:r>
+              <a:rPr lang="en-US" dirty="0" smtClean="0"/>
+              <a:t>Change graphics dump frequency based on shock locations</a:t>
+            </a:r>
+          </a:p>
+          <a:p>
+            <a:pPr lvl="1"/>
+            <a:r>
+              <a:rPr lang="en-US" dirty="0" smtClean="0"/>
+              <a:t>ρR monitors</a:t>
+            </a:r>
+          </a:p>
+        </p:txBody>
+      </p:sp>
+    </p:spTree>
+  </p:cSld>
+  <p:clrMapOvr>
+    <a:masterClrMapping/>
+  </p:clrMapOvr>
+  <p:timing>
+    <p:tnLst>
+      <p:par>
+        <p:cTn id="1" dur="indefinite" restart="never" nodeType="tmRoot"/>
+      </p:par>
+    </p:tnLst>
+  </p:timing>
+</p:sld>
+</file>
+
+<file path=ppt/slides/slide13.xml><?xml version="1.0" encoding="utf-8"?>
+<p:sld xmlns:a="http://schemas.openxmlformats.org/drawingml/2006/main" xmlns:r="http://schemas.openxmlformats.org/officeDocument/2006/relationships" xmlns:mc="http://schemas.openxmlformats.org/markup-compatibility/2006" xmlns:mv="urn:schemas-microsoft-com:mac:vml" xmlns:p="http://schemas.openxmlformats.org/presentationml/2006/main" mc:Ignorable="mv" mc:PreserveAttributes="mv:*">
+  <p:cSld>
+    <p:spTree>
+      <p:nvGrpSpPr>
+        <p:cNvPr id="1" name=""/>
+        <p:cNvGrpSpPr/>
+        <p:nvPr/>
+      </p:nvGrpSpPr>
+      <p:grpSpPr>
+        <a:xfrm>
+          <a:off x="0" y="0"/>
+          <a:ext cx="0" cy="0"/>
+          <a:chOff x="0" y="0"/>
+          <a:chExt cx="0" cy="0"/>
+        </a:xfrm>
+      </p:grpSpPr>
+      <p:sp>
+        <p:nvSpPr>
+          <p:cNvPr id="2" name="Title 1"/>
+          <p:cNvSpPr>
+            <a:spLocks noGrp="1"/>
+          </p:cNvSpPr>
+          <p:nvPr>
+            <p:ph type="title"/>
+          </p:nvPr>
+        </p:nvSpPr>
+        <p:spPr/>
+        <p:txBody>
+          <a:bodyPr/>
+          <a:lstStyle/>
+          <a:p>
+            <a:r>
+              <a:rPr lang="en-US" dirty="0" smtClean="0"/>
               <a:t>Pre-pulse consists of a picket and 3 pedestal segments </a:t>
             </a:r>
             <a:endParaRPr lang="en-US" dirty="0"/>
@@ -4667,10 +5106,166 @@
   <p:clrMapOvr>
     <a:masterClrMapping/>
   </p:clrMapOvr>
+  <p:timing>
+    <p:tnLst>
+      <p:par>
+        <p:cTn id="1" dur="indefinite" restart="never" nodeType="tmRoot"/>
+      </p:par>
+    </p:tnLst>
+  </p:timing>
 </p:sld>
 </file>
 
-<file path=ppt/slides/slide11.xml><?xml version="1.0" encoding="utf-8"?>
+<file path=ppt/slides/slide14.xml><?xml version="1.0" encoding="utf-8"?>
+<p:sld xmlns:a="http://schemas.openxmlformats.org/drawingml/2006/main" xmlns:r="http://schemas.openxmlformats.org/officeDocument/2006/relationships" xmlns:mc="http://schemas.openxmlformats.org/markup-compatibility/2006" xmlns:mv="urn:schemas-microsoft-com:mac:vml" xmlns:p="http://schemas.openxmlformats.org/presentationml/2006/main" mc:Ignorable="mv" mc:PreserveAttributes="mv:*">
+  <p:cSld>
+    <p:spTree>
+      <p:nvGrpSpPr>
+        <p:cNvPr id="1" name=""/>
+        <p:cNvGrpSpPr/>
+        <p:nvPr/>
+      </p:nvGrpSpPr>
+      <p:grpSpPr>
+        <a:xfrm>
+          <a:off x="0" y="0"/>
+          <a:ext cx="0" cy="0"/>
+          <a:chOff x="0" y="0"/>
+          <a:chExt cx="0" cy="0"/>
+        </a:xfrm>
+      </p:grpSpPr>
+      <p:sp>
+        <p:nvSpPr>
+          <p:cNvPr id="2" name="Title 1"/>
+          <p:cNvSpPr>
+            <a:spLocks noGrp="1"/>
+          </p:cNvSpPr>
+          <p:nvPr>
+            <p:ph type="title"/>
+          </p:nvPr>
+        </p:nvSpPr>
+        <p:spPr/>
+        <p:txBody>
+          <a:bodyPr/>
+          <a:lstStyle/>
+          <a:p>
+            <a:r>
+              <a:rPr lang="en-US" dirty="0" smtClean="0"/>
+              <a:t>Lets focus on the pre-pulse shocks</a:t>
+            </a:r>
+            <a:endParaRPr lang="en-US" dirty="0"/>
+          </a:p>
+        </p:txBody>
+      </p:sp>
+      <p:pic>
+        <p:nvPicPr>
+          <p:cNvPr id="3" name="Picture 2" descr="rtplot_full.pdf"/>
+          <p:cNvPicPr>
+            <a:picLocks noChangeAspect="1"/>
+          </p:cNvPicPr>
+          <p:nvPr/>
+        </p:nvPicPr>
+        <mc:AlternateContent>
+          <mc:Choice xmlns:ma="http://schemas.microsoft.com/office/mac/drawingml/2008/main" Requires="ma">
+            <p:blipFill>
+              <a:blip r:embed="rId2"/>
+              <a:srcRect l="3425" t="7516" b="2510"/>
+              <a:stretch>
+                <a:fillRect/>
+              </a:stretch>
+            </p:blipFill>
+          </mc:Choice>
+          <mc:Fallback>
+            <p:blipFill>
+              <a:blip r:embed="rId3"/>
+              <a:srcRect l="3425" t="7516" b="2510"/>
+              <a:stretch>
+                <a:fillRect/>
+              </a:stretch>
+            </p:blipFill>
+          </mc:Fallback>
+        </mc:AlternateContent>
+        <p:spPr>
+          <a:xfrm>
+            <a:off x="383117" y="1031208"/>
+            <a:ext cx="8257090" cy="5769503"/>
+          </a:xfrm>
+          <a:prstGeom prst="rect">
+            <a:avLst/>
+          </a:prstGeom>
+        </p:spPr>
+      </p:pic>
+      <p:sp>
+        <p:nvSpPr>
+          <p:cNvPr id="4" name="Rectangle 3"/>
+          <p:cNvSpPr/>
+          <p:nvPr/>
+        </p:nvSpPr>
+        <p:spPr bwMode="auto">
+          <a:xfrm>
+            <a:off x="1186599" y="1251544"/>
+            <a:ext cx="4792750" cy="1548207"/>
+          </a:xfrm>
+          <a:prstGeom prst="rect">
+            <a:avLst/>
+          </a:prstGeom>
+          <a:noFill/>
+          <a:ln w="38100" cap="flat" cmpd="sng" algn="ctr">
+            <a:solidFill>
+              <a:srgbClr val="FFFF00"/>
+            </a:solidFill>
+            <a:prstDash val="solid"/>
+            <a:round/>
+            <a:headEnd type="none" w="med" len="med"/>
+            <a:tailEnd type="none" w="med" len="med"/>
+          </a:ln>
+          <a:effectLst/>
+        </p:spPr>
+        <p:txBody>
+          <a:bodyPr vert="horz" wrap="square" lIns="91440" tIns="45720" rIns="91440" bIns="45720" numCol="1" rtlCol="0" anchor="t" anchorCtr="0" compatLnSpc="1">
+            <a:prstTxWarp prst="textNoShape">
+              <a:avLst/>
+            </a:prstTxWarp>
+          </a:bodyPr>
+          <a:lstStyle/>
+          <a:p>
+            <a:pPr marL="0" marR="0" indent="0" algn="ctr" defTabSz="914400" rtl="0" eaLnBrk="0" fontAlgn="base" latinLnBrk="0" hangingPunct="0">
+              <a:lnSpc>
+                <a:spcPct val="100000"/>
+              </a:lnSpc>
+              <a:spcBef>
+                <a:spcPct val="0"/>
+              </a:spcBef>
+              <a:spcAft>
+                <a:spcPct val="0"/>
+              </a:spcAft>
+              <a:buClrTx/>
+              <a:buSzTx/>
+              <a:buFontTx/>
+              <a:buNone/>
+              <a:tabLst/>
+            </a:pPr>
+            <a:endParaRPr kumimoji="0" lang="en-US" sz="1800" b="1" i="0" u="none" strike="noStrike" cap="none" normalizeH="0" baseline="0">
+              <a:ln>
+                <a:noFill/>
+              </a:ln>
+              <a:solidFill>
+                <a:schemeClr val="tx1"/>
+              </a:solidFill>
+              <a:effectLst/>
+              <a:latin typeface="Helvetica" pitchFamily="-111" charset="0"/>
+            </a:endParaRPr>
+          </a:p>
+        </p:txBody>
+      </p:sp>
+    </p:spTree>
+  </p:cSld>
+  <p:clrMapOvr>
+    <a:masterClrMapping/>
+  </p:clrMapOvr>
+</p:sld>
+</file>
+
+<file path=ppt/slides/slide15.xml><?xml version="1.0" encoding="utf-8"?>
 <p:sld xmlns:a="http://schemas.openxmlformats.org/drawingml/2006/main" xmlns:r="http://schemas.openxmlformats.org/officeDocument/2006/relationships" xmlns:mc="http://schemas.openxmlformats.org/markup-compatibility/2006" xmlns:mv="urn:schemas-microsoft-com:mac:vml" xmlns:p="http://schemas.openxmlformats.org/presentationml/2006/main" mc:Ignorable="mv" mc:PreserveAttributes="mv:*">
   <p:cSld>
     <p:spTree>
@@ -5428,10 +6023,17 @@
   <p:clrMapOvr>
     <a:masterClrMapping/>
   </p:clrMapOvr>
+  <p:timing>
+    <p:tnLst>
+      <p:par>
+        <p:cTn id="1" dur="indefinite" restart="never" nodeType="tmRoot"/>
+      </p:par>
+    </p:tnLst>
+  </p:timing>
 </p:sld>
 </file>
 
-<file path=ppt/slides/slide12.xml><?xml version="1.0" encoding="utf-8"?>
+<file path=ppt/slides/slide16.xml><?xml version="1.0" encoding="utf-8"?>
 <p:sld xmlns:a="http://schemas.openxmlformats.org/drawingml/2006/main" xmlns:r="http://schemas.openxmlformats.org/officeDocument/2006/relationships" xmlns:mc="http://schemas.openxmlformats.org/markup-compatibility/2006" xmlns:mv="urn:schemas-microsoft-com:mac:vml" xmlns:p="http://schemas.openxmlformats.org/presentationml/2006/main" mc:Ignorable="mv" mc:PreserveAttributes="mv:*">
   <p:cSld>
     <p:spTree>
@@ -6252,10 +6854,17 @@
   <p:clrMapOvr>
     <a:masterClrMapping/>
   </p:clrMapOvr>
+  <p:timing>
+    <p:tnLst>
+      <p:par>
+        <p:cTn id="1" dur="indefinite" restart="never" nodeType="tmRoot"/>
+      </p:par>
+    </p:tnLst>
+  </p:timing>
 </p:sld>
 </file>
 
-<file path=ppt/slides/slide13.xml><?xml version="1.0" encoding="utf-8"?>
+<file path=ppt/slides/slide17.xml><?xml version="1.0" encoding="utf-8"?>
 <p:sld xmlns:a="http://schemas.openxmlformats.org/drawingml/2006/main" xmlns:r="http://schemas.openxmlformats.org/officeDocument/2006/relationships" xmlns:mc="http://schemas.openxmlformats.org/markup-compatibility/2006" xmlns:mv="urn:schemas-microsoft-com:mac:vml" xmlns:p="http://schemas.openxmlformats.org/presentationml/2006/main" mc:Ignorable="mv" mc:PreserveAttributes="mv:*">
   <p:cSld>
     <p:spTree>
@@ -6734,7 +7343,7 @@
 </p:sld>
 </file>
 
-<file path=ppt/slides/slide14.xml><?xml version="1.0" encoding="utf-8"?>
+<file path=ppt/slides/slide18.xml><?xml version="1.0" encoding="utf-8"?>
 <p:sld xmlns:a="http://schemas.openxmlformats.org/drawingml/2006/main" xmlns:r="http://schemas.openxmlformats.org/officeDocument/2006/relationships" xmlns:mc="http://schemas.openxmlformats.org/markup-compatibility/2006" xmlns:mv="urn:schemas-microsoft-com:mac:vml" xmlns:p="http://schemas.openxmlformats.org/presentationml/2006/main" mc:Ignorable="mv" mc:PreserveAttributes="mv:*">
   <p:cSld>
     <p:spTree>
@@ -7178,7 +7787,7 @@
 </p:sld>
 </file>
 
-<file path=ppt/slides/slide15.xml><?xml version="1.0" encoding="utf-8"?>
+<file path=ppt/slides/slide19.xml><?xml version="1.0" encoding="utf-8"?>
 <p:sld xmlns:a="http://schemas.openxmlformats.org/drawingml/2006/main" xmlns:r="http://schemas.openxmlformats.org/officeDocument/2006/relationships" xmlns:mc="http://schemas.openxmlformats.org/markup-compatibility/2006" xmlns:mv="urn:schemas-microsoft-com:mac:vml" xmlns:p="http://schemas.openxmlformats.org/presentationml/2006/main" mc:Ignorable="mv" mc:PreserveAttributes="mv:*">
   <p:cSld>
     <p:spTree>
@@ -7478,7 +8087,333 @@
 </p:sld>
 </file>
 
-<file path=ppt/slides/slide16.xml><?xml version="1.0" encoding="utf-8"?>
+<file path=ppt/slides/slide2.xml><?xml version="1.0" encoding="utf-8"?>
+<p:sld xmlns:a="http://schemas.openxmlformats.org/drawingml/2006/main" xmlns:r="http://schemas.openxmlformats.org/officeDocument/2006/relationships" xmlns:mc="http://schemas.openxmlformats.org/markup-compatibility/2006" xmlns:mv="urn:schemas-microsoft-com:mac:vml" xmlns:p="http://schemas.openxmlformats.org/presentationml/2006/main" mc:Ignorable="mv" mc:PreserveAttributes="mv:*">
+  <p:cSld>
+    <p:spTree>
+      <p:nvGrpSpPr>
+        <p:cNvPr id="1" name=""/>
+        <p:cNvGrpSpPr/>
+        <p:nvPr/>
+      </p:nvGrpSpPr>
+      <p:grpSpPr>
+        <a:xfrm>
+          <a:off x="0" y="0"/>
+          <a:ext cx="0" cy="0"/>
+          <a:chOff x="0" y="0"/>
+          <a:chExt cx="0" cy="0"/>
+        </a:xfrm>
+      </p:grpSpPr>
+      <p:sp>
+        <p:nvSpPr>
+          <p:cNvPr id="2" name="Title 1"/>
+          <p:cNvSpPr>
+            <a:spLocks noGrp="1"/>
+          </p:cNvSpPr>
+          <p:nvPr>
+            <p:ph type="title"/>
+          </p:nvPr>
+        </p:nvSpPr>
+        <p:spPr/>
+        <p:txBody>
+          <a:bodyPr/>
+          <a:lstStyle/>
+          <a:p>
+            <a:r>
+              <a:rPr lang="en-US" dirty="0" smtClean="0"/>
+              <a:t>ICF works by compressing DT fuel to high density and relying on the fuel inertial to confine it</a:t>
+            </a:r>
+            <a:endParaRPr lang="en-US" dirty="0"/>
+          </a:p>
+        </p:txBody>
+      </p:sp>
+      <p:pic>
+        <p:nvPicPr>
+          <p:cNvPr id="12" name="Content Placeholder 4" descr="740px-Inertial_confinement_fusion.svg.png"/>
+          <p:cNvPicPr>
+            <a:picLocks noGrp="1" noChangeAspect="1"/>
+          </p:cNvPicPr>
+          <p:nvPr>
+            <p:ph sz="half" idx="4294967295"/>
+          </p:nvPr>
+        </p:nvPicPr>
+        <p:blipFill>
+          <a:blip r:embed="rId2"/>
+          <a:srcRect t="-383" r="77422" b="8759"/>
+          <a:stretch>
+            <a:fillRect/>
+          </a:stretch>
+        </p:blipFill>
+        <p:spPr>
+          <a:xfrm>
+            <a:off x="66843" y="1269410"/>
+            <a:ext cx="1659392" cy="1911258"/>
+          </a:xfrm>
+        </p:spPr>
+      </p:pic>
+      <p:sp>
+        <p:nvSpPr>
+          <p:cNvPr id="13" name="TextBox 12"/>
+          <p:cNvSpPr txBox="1"/>
+          <p:nvPr/>
+        </p:nvSpPr>
+        <p:spPr>
+          <a:xfrm>
+            <a:off x="1705736" y="1446230"/>
+            <a:ext cx="2790363" cy="1477328"/>
+          </a:xfrm>
+          <a:prstGeom prst="rect">
+            <a:avLst/>
+          </a:prstGeom>
+          <a:noFill/>
+        </p:spPr>
+        <p:txBody>
+          <a:bodyPr wrap="square" rtlCol="0">
+            <a:spAutoFit/>
+          </a:bodyPr>
+          <a:lstStyle/>
+          <a:p>
+            <a:pPr algn="l"/>
+            <a:r>
+              <a:rPr lang="en-US" dirty="0" smtClean="0"/>
+              <a:t>A high intensity driver (x-rays, laser, heavy ion beam, etc) illuminates the surface of a layered spherical pellet</a:t>
+            </a:r>
+          </a:p>
+        </p:txBody>
+      </p:sp>
+      <p:pic>
+        <p:nvPicPr>
+          <p:cNvPr id="14" name="Content Placeholder 4" descr="740px-Inertial_confinement_fusion.svg.png"/>
+          <p:cNvPicPr>
+            <a:picLocks noChangeAspect="1"/>
+          </p:cNvPicPr>
+          <p:nvPr/>
+        </p:nvPicPr>
+        <p:blipFill>
+          <a:blip r:embed="rId2"/>
+          <a:srcRect l="26059" t="-383" r="45252" b="-351"/>
+          <a:stretch>
+            <a:fillRect/>
+          </a:stretch>
+        </p:blipFill>
+        <p:spPr bwMode="auto">
+          <a:xfrm>
+            <a:off x="4462723" y="1297809"/>
+            <a:ext cx="2108533" cy="2101009"/>
+          </a:xfrm>
+          <a:prstGeom prst="rect">
+            <a:avLst/>
+          </a:prstGeom>
+          <a:noFill/>
+          <a:ln w="9525">
+            <a:noFill/>
+            <a:miter lim="800000"/>
+            <a:headEnd/>
+            <a:tailEnd/>
+          </a:ln>
+        </p:spPr>
+      </p:pic>
+      <p:sp>
+        <p:nvSpPr>
+          <p:cNvPr id="15" name="TextBox 14"/>
+          <p:cNvSpPr txBox="1"/>
+          <p:nvPr/>
+        </p:nvSpPr>
+        <p:spPr>
+          <a:xfrm>
+            <a:off x="6502612" y="1390604"/>
+            <a:ext cx="2641388" cy="1754327"/>
+          </a:xfrm>
+          <a:prstGeom prst="rect">
+            <a:avLst/>
+          </a:prstGeom>
+          <a:noFill/>
+        </p:spPr>
+        <p:txBody>
+          <a:bodyPr wrap="square" rtlCol="0">
+            <a:spAutoFit/>
+          </a:bodyPr>
+          <a:lstStyle/>
+          <a:p>
+            <a:pPr algn="l"/>
+            <a:r>
+              <a:rPr lang="en-US" dirty="0" smtClean="0"/>
+              <a:t>The outer surface of the pellet ablates, compressing DT fuel and driving an imploding spherical rocket</a:t>
+            </a:r>
+          </a:p>
+        </p:txBody>
+      </p:sp>
+      <p:pic>
+        <p:nvPicPr>
+          <p:cNvPr id="16" name="Content Placeholder 4" descr="740px-Inertial_confinement_fusion.svg.png"/>
+          <p:cNvPicPr>
+            <a:picLocks noChangeAspect="1"/>
+          </p:cNvPicPr>
+          <p:nvPr/>
+        </p:nvPicPr>
+        <p:blipFill>
+          <a:blip r:embed="rId2"/>
+          <a:srcRect l="57764" t="-383" r="15515" b="-351"/>
+          <a:stretch>
+            <a:fillRect/>
+          </a:stretch>
+        </p:blipFill>
+        <p:spPr bwMode="auto">
+          <a:xfrm>
+            <a:off x="0" y="4113872"/>
+            <a:ext cx="1963904" cy="2101009"/>
+          </a:xfrm>
+          <a:prstGeom prst="rect">
+            <a:avLst/>
+          </a:prstGeom>
+          <a:noFill/>
+          <a:ln w="9525">
+            <a:noFill/>
+            <a:miter lim="800000"/>
+            <a:headEnd/>
+            <a:tailEnd/>
+          </a:ln>
+        </p:spPr>
+      </p:pic>
+      <p:sp>
+        <p:nvSpPr>
+          <p:cNvPr id="17" name="TextBox 16"/>
+          <p:cNvSpPr txBox="1"/>
+          <p:nvPr/>
+        </p:nvSpPr>
+        <p:spPr>
+          <a:xfrm>
+            <a:off x="2030197" y="4292334"/>
+            <a:ext cx="2326847" cy="1754327"/>
+          </a:xfrm>
+          <a:prstGeom prst="rect">
+            <a:avLst/>
+          </a:prstGeom>
+          <a:noFill/>
+        </p:spPr>
+        <p:txBody>
+          <a:bodyPr wrap="square" rtlCol="0">
+            <a:spAutoFit/>
+          </a:bodyPr>
+          <a:lstStyle/>
+          <a:p>
+            <a:pPr algn="l"/>
+            <a:r>
+              <a:rPr lang="en-US" dirty="0" smtClean="0"/>
+              <a:t>The dense imploding shell stagnates on axis and converts its kinetic energy to thermal energy</a:t>
+            </a:r>
+          </a:p>
+        </p:txBody>
+      </p:sp>
+      <p:pic>
+        <p:nvPicPr>
+          <p:cNvPr id="18" name="Content Placeholder 4" descr="740px-Inertial_confinement_fusion.svg.png"/>
+          <p:cNvPicPr>
+            <a:picLocks noChangeAspect="1"/>
+          </p:cNvPicPr>
+          <p:nvPr/>
+        </p:nvPicPr>
+        <p:blipFill>
+          <a:blip r:embed="rId2"/>
+          <a:srcRect l="84738" t="-383" b="25518"/>
+          <a:stretch>
+            <a:fillRect/>
+          </a:stretch>
+        </p:blipFill>
+        <p:spPr bwMode="auto">
+          <a:xfrm>
+            <a:off x="4520020" y="4040891"/>
+            <a:ext cx="1121696" cy="1561463"/>
+          </a:xfrm>
+          <a:prstGeom prst="rect">
+            <a:avLst/>
+          </a:prstGeom>
+          <a:noFill/>
+          <a:ln w="9525">
+            <a:noFill/>
+            <a:miter lim="800000"/>
+            <a:headEnd/>
+            <a:tailEnd/>
+          </a:ln>
+        </p:spPr>
+      </p:pic>
+      <p:sp>
+        <p:nvSpPr>
+          <p:cNvPr id="19" name="TextBox 18"/>
+          <p:cNvSpPr txBox="1"/>
+          <p:nvPr/>
+        </p:nvSpPr>
+        <p:spPr>
+          <a:xfrm>
+            <a:off x="5767369" y="4292334"/>
+            <a:ext cx="3376632" cy="2031325"/>
+          </a:xfrm>
+          <a:prstGeom prst="rect">
+            <a:avLst/>
+          </a:prstGeom>
+          <a:noFill/>
+        </p:spPr>
+        <p:txBody>
+          <a:bodyPr wrap="square" rtlCol="0">
+            <a:spAutoFit/>
+          </a:bodyPr>
+          <a:lstStyle/>
+          <a:p>
+            <a:pPr algn="l"/>
+            <a:r>
+              <a:rPr lang="en-US" dirty="0" smtClean="0"/>
+              <a:t>The high stagnation temperature initiations a fusion burn wave.  The burn wave propagates faster than the shell can disassemble, releasing large amounts of energy</a:t>
+            </a:r>
+          </a:p>
+        </p:txBody>
+      </p:sp>
+      <p:sp>
+        <p:nvSpPr>
+          <p:cNvPr id="20" name="TextBox 19"/>
+          <p:cNvSpPr txBox="1"/>
+          <p:nvPr/>
+        </p:nvSpPr>
+        <p:spPr>
+          <a:xfrm>
+            <a:off x="0" y="6550223"/>
+            <a:ext cx="6313080" cy="276999"/>
+          </a:xfrm>
+          <a:prstGeom prst="rect">
+            <a:avLst/>
+          </a:prstGeom>
+          <a:noFill/>
+        </p:spPr>
+        <p:txBody>
+          <a:bodyPr wrap="square" rtlCol="0">
+            <a:spAutoFit/>
+          </a:bodyPr>
+          <a:lstStyle/>
+          <a:p>
+            <a:pPr algn="l"/>
+            <a:r>
+              <a:rPr lang="en-US" sz="1200" b="0" dirty="0" err="1" smtClean="0"/>
+              <a:t>http://en.wikipedia.org/wiki/File:Inertial_confinement_fusion.svg</a:t>
+            </a:r>
+            <a:endParaRPr lang="en-US" sz="1200" b="0" dirty="0" smtClean="0"/>
+          </a:p>
+        </p:txBody>
+      </p:sp>
+    </p:spTree>
+  </p:cSld>
+  <p:clrMapOvr>
+    <a:masterClrMapping/>
+  </p:clrMapOvr>
+  <p:timing>
+    <p:tnLst>
+      <p:par>
+        <p:cTn id="1" dur="indefinite" restart="never" nodeType="tmRoot"/>
+      </p:par>
+    </p:tnLst>
+  </p:timing>
+</p:sld>
+</file>
+
+<file path=ppt/slides/slide20.xml><?xml version="1.0" encoding="utf-8"?>
 <p:sld xmlns:a="http://schemas.openxmlformats.org/drawingml/2006/main" xmlns:r="http://schemas.openxmlformats.org/officeDocument/2006/relationships" xmlns:mc="http://schemas.openxmlformats.org/markup-compatibility/2006" xmlns:mv="urn:schemas-microsoft-com:mac:vml" xmlns:p="http://schemas.openxmlformats.org/presentationml/2006/main" mc:Ignorable="mv" mc:PreserveAttributes="mv:*">
   <p:cSld>
     <p:spTree>
@@ -7658,7 +8593,7 @@
 </p:sld>
 </file>
 
-<file path=ppt/slides/slide17.xml><?xml version="1.0" encoding="utf-8"?>
+<file path=ppt/slides/slide21.xml><?xml version="1.0" encoding="utf-8"?>
 <p:sld xmlns:a="http://schemas.openxmlformats.org/drawingml/2006/main" xmlns:r="http://schemas.openxmlformats.org/officeDocument/2006/relationships" xmlns:mc="http://schemas.openxmlformats.org/markup-compatibility/2006" xmlns:mv="urn:schemas-microsoft-com:mac:vml" xmlns:p="http://schemas.openxmlformats.org/presentationml/2006/main" mc:Ignorable="mv" mc:PreserveAttributes="mv:*">
   <p:cSld>
     <p:spTree>
@@ -8019,7 +8954,7 @@
 </p:sld>
 </file>
 
-<file path=ppt/slides/slide18.xml><?xml version="1.0" encoding="utf-8"?>
+<file path=ppt/slides/slide22.xml><?xml version="1.0" encoding="utf-8"?>
 <p:sld xmlns:a="http://schemas.openxmlformats.org/drawingml/2006/main" xmlns:r="http://schemas.openxmlformats.org/officeDocument/2006/relationships" xmlns:mc="http://schemas.openxmlformats.org/markup-compatibility/2006" xmlns:mv="urn:schemas-microsoft-com:mac:vml" xmlns:p="http://schemas.openxmlformats.org/presentationml/2006/main" mc:Ignorable="mv" mc:PreserveAttributes="mv:*">
   <p:cSld>
     <p:spTree>
@@ -8274,7 +9209,7 @@
 </p:sld>
 </file>
 
-<file path=ppt/slides/slide19.xml><?xml version="1.0" encoding="utf-8"?>
+<file path=ppt/slides/slide23.xml><?xml version="1.0" encoding="utf-8"?>
 <p:sld xmlns:a="http://schemas.openxmlformats.org/drawingml/2006/main" xmlns:r="http://schemas.openxmlformats.org/officeDocument/2006/relationships" xmlns:mc="http://schemas.openxmlformats.org/markup-compatibility/2006" xmlns:mv="urn:schemas-microsoft-com:mac:vml" xmlns:p="http://schemas.openxmlformats.org/presentationml/2006/main" mc:Ignorable="mv" mc:PreserveAttributes="mv:*">
   <p:cSld>
     <p:spTree>
@@ -9320,769 +10255,6 @@
 </p:sld>
 </file>
 
-<file path=ppt/slides/slide2.xml><?xml version="1.0" encoding="utf-8"?>
-<p:sld xmlns:a="http://schemas.openxmlformats.org/drawingml/2006/main" xmlns:r="http://schemas.openxmlformats.org/officeDocument/2006/relationships" xmlns:mc="http://schemas.openxmlformats.org/markup-compatibility/2006" xmlns:mv="urn:schemas-microsoft-com:mac:vml" xmlns:p="http://schemas.openxmlformats.org/presentationml/2006/main" mc:Ignorable="mv" mc:PreserveAttributes="mv:*">
-  <p:cSld>
-    <p:spTree>
-      <p:nvGrpSpPr>
-        <p:cNvPr id="1" name=""/>
-        <p:cNvGrpSpPr/>
-        <p:nvPr/>
-      </p:nvGrpSpPr>
-      <p:grpSpPr>
-        <a:xfrm>
-          <a:off x="0" y="0"/>
-          <a:ext cx="0" cy="0"/>
-          <a:chOff x="0" y="0"/>
-          <a:chExt cx="0" cy="0"/>
-        </a:xfrm>
-      </p:grpSpPr>
-      <p:sp>
-        <p:nvSpPr>
-          <p:cNvPr id="2" name="Title 1"/>
-          <p:cNvSpPr>
-            <a:spLocks noGrp="1"/>
-          </p:cNvSpPr>
-          <p:nvPr>
-            <p:ph type="title"/>
-          </p:nvPr>
-        </p:nvSpPr>
-        <p:spPr/>
-        <p:txBody>
-          <a:bodyPr/>
-          <a:lstStyle/>
-          <a:p>
-            <a:r>
-              <a:rPr lang="en-US" dirty="0" smtClean="0"/>
-              <a:t>ICF works by compressing DT fuel to high density and relying on the fuel inertial to confine it</a:t>
-            </a:r>
-            <a:endParaRPr lang="en-US" dirty="0"/>
-          </a:p>
-        </p:txBody>
-      </p:sp>
-      <p:pic>
-        <p:nvPicPr>
-          <p:cNvPr id="12" name="Content Placeholder 4" descr="740px-Inertial_confinement_fusion.svg.png"/>
-          <p:cNvPicPr>
-            <a:picLocks noGrp="1" noChangeAspect="1"/>
-          </p:cNvPicPr>
-          <p:nvPr>
-            <p:ph sz="half" idx="4294967295"/>
-          </p:nvPr>
-        </p:nvPicPr>
-        <p:blipFill>
-          <a:blip r:embed="rId2"/>
-          <a:srcRect t="-383" r="77422" b="8759"/>
-          <a:stretch>
-            <a:fillRect/>
-          </a:stretch>
-        </p:blipFill>
-        <p:spPr>
-          <a:xfrm>
-            <a:off x="66843" y="1269410"/>
-            <a:ext cx="1659392" cy="1911258"/>
-          </a:xfrm>
-        </p:spPr>
-      </p:pic>
-      <p:sp>
-        <p:nvSpPr>
-          <p:cNvPr id="13" name="TextBox 12"/>
-          <p:cNvSpPr txBox="1"/>
-          <p:nvPr/>
-        </p:nvSpPr>
-        <p:spPr>
-          <a:xfrm>
-            <a:off x="1705736" y="1446230"/>
-            <a:ext cx="2790363" cy="1477328"/>
-          </a:xfrm>
-          <a:prstGeom prst="rect">
-            <a:avLst/>
-          </a:prstGeom>
-          <a:noFill/>
-        </p:spPr>
-        <p:txBody>
-          <a:bodyPr wrap="square" rtlCol="0">
-            <a:spAutoFit/>
-          </a:bodyPr>
-          <a:lstStyle/>
-          <a:p>
-            <a:pPr algn="l"/>
-            <a:r>
-              <a:rPr lang="en-US" dirty="0" smtClean="0"/>
-              <a:t>A high intensity driver (x-rays, laser, heavy ion beam, etc) illuminates the surface of a layered spherical pellet</a:t>
-            </a:r>
-          </a:p>
-        </p:txBody>
-      </p:sp>
-      <p:pic>
-        <p:nvPicPr>
-          <p:cNvPr id="14" name="Content Placeholder 4" descr="740px-Inertial_confinement_fusion.svg.png"/>
-          <p:cNvPicPr>
-            <a:picLocks noChangeAspect="1"/>
-          </p:cNvPicPr>
-          <p:nvPr/>
-        </p:nvPicPr>
-        <p:blipFill>
-          <a:blip r:embed="rId2"/>
-          <a:srcRect l="26059" t="-383" r="45252" b="-351"/>
-          <a:stretch>
-            <a:fillRect/>
-          </a:stretch>
-        </p:blipFill>
-        <p:spPr bwMode="auto">
-          <a:xfrm>
-            <a:off x="4462723" y="1297809"/>
-            <a:ext cx="2108533" cy="2101009"/>
-          </a:xfrm>
-          <a:prstGeom prst="rect">
-            <a:avLst/>
-          </a:prstGeom>
-          <a:noFill/>
-          <a:ln w="9525">
-            <a:noFill/>
-            <a:miter lim="800000"/>
-            <a:headEnd/>
-            <a:tailEnd/>
-          </a:ln>
-        </p:spPr>
-      </p:pic>
-      <p:sp>
-        <p:nvSpPr>
-          <p:cNvPr id="15" name="TextBox 14"/>
-          <p:cNvSpPr txBox="1"/>
-          <p:nvPr/>
-        </p:nvSpPr>
-        <p:spPr>
-          <a:xfrm>
-            <a:off x="6502612" y="1390604"/>
-            <a:ext cx="2641388" cy="1754327"/>
-          </a:xfrm>
-          <a:prstGeom prst="rect">
-            <a:avLst/>
-          </a:prstGeom>
-          <a:noFill/>
-        </p:spPr>
-        <p:txBody>
-          <a:bodyPr wrap="square" rtlCol="0">
-            <a:spAutoFit/>
-          </a:bodyPr>
-          <a:lstStyle/>
-          <a:p>
-            <a:pPr algn="l"/>
-            <a:r>
-              <a:rPr lang="en-US" dirty="0" smtClean="0"/>
-              <a:t>The outer surface of the pellet ablates, compressing DT fuel and driving an imploding spherical rocket</a:t>
-            </a:r>
-          </a:p>
-        </p:txBody>
-      </p:sp>
-      <p:pic>
-        <p:nvPicPr>
-          <p:cNvPr id="16" name="Content Placeholder 4" descr="740px-Inertial_confinement_fusion.svg.png"/>
-          <p:cNvPicPr>
-            <a:picLocks noChangeAspect="1"/>
-          </p:cNvPicPr>
-          <p:nvPr/>
-        </p:nvPicPr>
-        <p:blipFill>
-          <a:blip r:embed="rId2"/>
-          <a:srcRect l="57764" t="-383" r="15515" b="-351"/>
-          <a:stretch>
-            <a:fillRect/>
-          </a:stretch>
-        </p:blipFill>
-        <p:spPr bwMode="auto">
-          <a:xfrm>
-            <a:off x="0" y="4113872"/>
-            <a:ext cx="1963904" cy="2101009"/>
-          </a:xfrm>
-          <a:prstGeom prst="rect">
-            <a:avLst/>
-          </a:prstGeom>
-          <a:noFill/>
-          <a:ln w="9525">
-            <a:noFill/>
-            <a:miter lim="800000"/>
-            <a:headEnd/>
-            <a:tailEnd/>
-          </a:ln>
-        </p:spPr>
-      </p:pic>
-      <p:sp>
-        <p:nvSpPr>
-          <p:cNvPr id="17" name="TextBox 16"/>
-          <p:cNvSpPr txBox="1"/>
-          <p:nvPr/>
-        </p:nvSpPr>
-        <p:spPr>
-          <a:xfrm>
-            <a:off x="2030197" y="4292334"/>
-            <a:ext cx="2326847" cy="1754327"/>
-          </a:xfrm>
-          <a:prstGeom prst="rect">
-            <a:avLst/>
-          </a:prstGeom>
-          <a:noFill/>
-        </p:spPr>
-        <p:txBody>
-          <a:bodyPr wrap="square" rtlCol="0">
-            <a:spAutoFit/>
-          </a:bodyPr>
-          <a:lstStyle/>
-          <a:p>
-            <a:pPr algn="l"/>
-            <a:r>
-              <a:rPr lang="en-US" dirty="0" smtClean="0"/>
-              <a:t>The dense imploding shell stagnates on axis and converts its kinetic energy to thermal energy</a:t>
-            </a:r>
-          </a:p>
-        </p:txBody>
-      </p:sp>
-      <p:pic>
-        <p:nvPicPr>
-          <p:cNvPr id="18" name="Content Placeholder 4" descr="740px-Inertial_confinement_fusion.svg.png"/>
-          <p:cNvPicPr>
-            <a:picLocks noChangeAspect="1"/>
-          </p:cNvPicPr>
-          <p:nvPr/>
-        </p:nvPicPr>
-        <p:blipFill>
-          <a:blip r:embed="rId2"/>
-          <a:srcRect l="84738" t="-383" b="25518"/>
-          <a:stretch>
-            <a:fillRect/>
-          </a:stretch>
-        </p:blipFill>
-        <p:spPr bwMode="auto">
-          <a:xfrm>
-            <a:off x="4520020" y="4040891"/>
-            <a:ext cx="1121696" cy="1561463"/>
-          </a:xfrm>
-          <a:prstGeom prst="rect">
-            <a:avLst/>
-          </a:prstGeom>
-          <a:noFill/>
-          <a:ln w="9525">
-            <a:noFill/>
-            <a:miter lim="800000"/>
-            <a:headEnd/>
-            <a:tailEnd/>
-          </a:ln>
-        </p:spPr>
-      </p:pic>
-      <p:sp>
-        <p:nvSpPr>
-          <p:cNvPr id="19" name="TextBox 18"/>
-          <p:cNvSpPr txBox="1"/>
-          <p:nvPr/>
-        </p:nvSpPr>
-        <p:spPr>
-          <a:xfrm>
-            <a:off x="5767369" y="4292334"/>
-            <a:ext cx="3376632" cy="2031325"/>
-          </a:xfrm>
-          <a:prstGeom prst="rect">
-            <a:avLst/>
-          </a:prstGeom>
-          <a:noFill/>
-        </p:spPr>
-        <p:txBody>
-          <a:bodyPr wrap="square" rtlCol="0">
-            <a:spAutoFit/>
-          </a:bodyPr>
-          <a:lstStyle/>
-          <a:p>
-            <a:pPr algn="l"/>
-            <a:r>
-              <a:rPr lang="en-US" dirty="0" smtClean="0"/>
-              <a:t>The high stagnation temperature initiations a fusion burn wave.  The burn wave propagates faster than the shell can disassemble, releasing large amounts of energy</a:t>
-            </a:r>
-          </a:p>
-        </p:txBody>
-      </p:sp>
-      <p:sp>
-        <p:nvSpPr>
-          <p:cNvPr id="20" name="TextBox 19"/>
-          <p:cNvSpPr txBox="1"/>
-          <p:nvPr/>
-        </p:nvSpPr>
-        <p:spPr>
-          <a:xfrm>
-            <a:off x="0" y="6550223"/>
-            <a:ext cx="6313080" cy="276999"/>
-          </a:xfrm>
-          <a:prstGeom prst="rect">
-            <a:avLst/>
-          </a:prstGeom>
-          <a:noFill/>
-        </p:spPr>
-        <p:txBody>
-          <a:bodyPr wrap="square" rtlCol="0">
-            <a:spAutoFit/>
-          </a:bodyPr>
-          <a:lstStyle/>
-          <a:p>
-            <a:pPr algn="l"/>
-            <a:r>
-              <a:rPr lang="en-US" sz="1200" b="0" dirty="0" err="1" smtClean="0"/>
-              <a:t>http://en.wikipedia.org/wiki/File:Inertial_confinement_fusion.svg</a:t>
-            </a:r>
-            <a:endParaRPr lang="en-US" sz="1200" b="0" dirty="0" smtClean="0"/>
-          </a:p>
-        </p:txBody>
-      </p:sp>
-    </p:spTree>
-  </p:cSld>
-  <p:clrMapOvr>
-    <a:masterClrMapping/>
-  </p:clrMapOvr>
-</p:sld>
-</file>
-
-<file path=ppt/slides/slide20.xml><?xml version="1.0" encoding="utf-8"?>
-<p:sld xmlns:a="http://schemas.openxmlformats.org/drawingml/2006/main" xmlns:r="http://schemas.openxmlformats.org/officeDocument/2006/relationships" xmlns:mc="http://schemas.openxmlformats.org/markup-compatibility/2006" xmlns:mv="urn:schemas-microsoft-com:mac:vml" xmlns:p="http://schemas.openxmlformats.org/presentationml/2006/main" mc:Ignorable="mv" mc:PreserveAttributes="mv:*">
-  <p:cSld>
-    <p:spTree>
-      <p:nvGrpSpPr>
-        <p:cNvPr id="1" name=""/>
-        <p:cNvGrpSpPr/>
-        <p:nvPr/>
-      </p:nvGrpSpPr>
-      <p:grpSpPr>
-        <a:xfrm>
-          <a:off x="0" y="0"/>
-          <a:ext cx="0" cy="0"/>
-          <a:chOff x="0" y="0"/>
-          <a:chExt cx="0" cy="0"/>
-        </a:xfrm>
-      </p:grpSpPr>
-      <p:sp>
-        <p:nvSpPr>
-          <p:cNvPr id="2" name="Title 1"/>
-          <p:cNvSpPr>
-            <a:spLocks noGrp="1"/>
-          </p:cNvSpPr>
-          <p:nvPr>
-            <p:ph type="title"/>
-          </p:nvPr>
-        </p:nvSpPr>
-        <p:spPr/>
-        <p:txBody>
-          <a:bodyPr/>
-          <a:lstStyle/>
-          <a:p>
-            <a:r>
-              <a:rPr lang="en-US" dirty="0" smtClean="0"/>
-              <a:t>Python is both extended by and embedded in Hydra</a:t>
-            </a:r>
-            <a:endParaRPr lang="en-US" dirty="0"/>
-          </a:p>
-        </p:txBody>
-      </p:sp>
-      <p:sp>
-        <p:nvSpPr>
-          <p:cNvPr id="3" name="Content Placeholder 2"/>
-          <p:cNvSpPr>
-            <a:spLocks noGrp="1"/>
-          </p:cNvSpPr>
-          <p:nvPr>
-            <p:ph idx="1"/>
-          </p:nvPr>
-        </p:nvSpPr>
-        <p:spPr/>
-        <p:txBody>
-          <a:bodyPr/>
-          <a:lstStyle/>
-          <a:p>
-            <a:r>
-              <a:rPr lang="en-US" sz="2000" dirty="0" smtClean="0"/>
-              <a:t>Python is extended through a module called “hydra” which contains functions and objects to manipulate hydra data structures</a:t>
-            </a:r>
-          </a:p>
-          <a:p>
-            <a:endParaRPr lang="en-US" sz="2000" dirty="0" smtClean="0"/>
-          </a:p>
-          <a:p>
-            <a:r>
-              <a:rPr lang="en-US" sz="2000" dirty="0" smtClean="0"/>
-              <a:t>Python is then embedded in the hydra executable</a:t>
-            </a:r>
-          </a:p>
-          <a:p>
-            <a:endParaRPr lang="en-US" sz="2000" dirty="0" smtClean="0"/>
-          </a:p>
-          <a:p>
-            <a:r>
-              <a:rPr lang="en-US" sz="2000" dirty="0" smtClean="0"/>
-              <a:t>Bottom line: Hydra makes available a Python interpreter running concurrently in parallel with the main Hydra executable.  The two processes are loosely coupled through the “hydra” Python module</a:t>
-            </a:r>
-          </a:p>
-        </p:txBody>
-      </p:sp>
-    </p:spTree>
-  </p:cSld>
-  <p:clrMapOvr>
-    <a:masterClrMapping/>
-  </p:clrMapOvr>
-</p:sld>
-</file>
-
-<file path=ppt/slides/slide21.xml><?xml version="1.0" encoding="utf-8"?>
-<p:sld xmlns:a="http://schemas.openxmlformats.org/drawingml/2006/main" xmlns:r="http://schemas.openxmlformats.org/officeDocument/2006/relationships" xmlns:mc="http://schemas.openxmlformats.org/markup-compatibility/2006" xmlns:mv="urn:schemas-microsoft-com:mac:vml" xmlns:p="http://schemas.openxmlformats.org/presentationml/2006/main" mc:Ignorable="mv" mc:PreserveAttributes="mv:*">
-  <p:cSld>
-    <p:spTree>
-      <p:nvGrpSpPr>
-        <p:cNvPr id="1" name=""/>
-        <p:cNvGrpSpPr/>
-        <p:nvPr/>
-      </p:nvGrpSpPr>
-      <p:grpSpPr>
-        <a:xfrm>
-          <a:off x="0" y="0"/>
-          <a:ext cx="0" cy="0"/>
-          <a:chOff x="0" y="0"/>
-          <a:chExt cx="0" cy="0"/>
-        </a:xfrm>
-      </p:grpSpPr>
-      <p:sp>
-        <p:nvSpPr>
-          <p:cNvPr id="2" name="Title 1"/>
-          <p:cNvSpPr>
-            <a:spLocks noGrp="1"/>
-          </p:cNvSpPr>
-          <p:nvPr>
-            <p:ph type="title"/>
-          </p:nvPr>
-        </p:nvSpPr>
-        <p:spPr/>
-        <p:txBody>
-          <a:bodyPr/>
-          <a:lstStyle/>
-          <a:p>
-            <a:r>
-              <a:rPr lang="en-US" dirty="0" smtClean="0"/>
-              <a:t>Interesting lessons learned</a:t>
-            </a:r>
-            <a:endParaRPr lang="en-US" dirty="0"/>
-          </a:p>
-        </p:txBody>
-      </p:sp>
-      <p:sp>
-        <p:nvSpPr>
-          <p:cNvPr id="3" name="Content Placeholder 2"/>
-          <p:cNvSpPr>
-            <a:spLocks noGrp="1"/>
-          </p:cNvSpPr>
-          <p:nvPr>
-            <p:ph idx="1"/>
-          </p:nvPr>
-        </p:nvSpPr>
-        <p:spPr>
-          <a:xfrm>
-            <a:off x="212725" y="1401379"/>
-            <a:ext cx="8778875" cy="4885121"/>
-          </a:xfrm>
-        </p:spPr>
-        <p:txBody>
-          <a:bodyPr/>
-          <a:lstStyle/>
-          <a:p>
-            <a:r>
-              <a:rPr lang="en-US" dirty="0" smtClean="0"/>
-              <a:t>Propagating modifications to the parser is tricky</a:t>
-            </a:r>
-          </a:p>
-          <a:p>
-            <a:pPr lvl="1"/>
-            <a:r>
-              <a:rPr lang="en-US" dirty="0" smtClean="0">
-                <a:latin typeface="Inconsolata"/>
-                <a:cs typeface="Inconsolata"/>
-              </a:rPr>
-              <a:t>from __future__ import </a:t>
-            </a:r>
-            <a:r>
-              <a:rPr lang="en-US" dirty="0" err="1" smtClean="0">
-                <a:latin typeface="Inconsolata"/>
-                <a:cs typeface="Inconsolata"/>
-              </a:rPr>
-              <a:t>with_statement</a:t>
-            </a:r>
-            <a:endParaRPr lang="en-US" dirty="0" smtClean="0">
-              <a:latin typeface="Inconsolata"/>
-              <a:cs typeface="Inconsolata"/>
-            </a:endParaRPr>
-          </a:p>
-          <a:p>
-            <a:pPr lvl="1"/>
-            <a:r>
-              <a:rPr lang="en-US" dirty="0" smtClean="0"/>
-              <a:t>Solution: custom parser</a:t>
-            </a:r>
-          </a:p>
-          <a:p>
-            <a:endParaRPr lang="en-US" dirty="0" smtClean="0"/>
-          </a:p>
-          <a:p>
-            <a:r>
-              <a:rPr lang="en-US" dirty="0" smtClean="0"/>
-              <a:t>Saving the state of </a:t>
-            </a:r>
-            <a:r>
-              <a:rPr lang="en-US" dirty="0" smtClean="0">
-                <a:latin typeface="Inconsolata"/>
-                <a:cs typeface="Inconsolata"/>
-              </a:rPr>
-              <a:t>__main__</a:t>
-            </a:r>
-            <a:r>
-              <a:rPr lang="en-US" dirty="0" smtClean="0"/>
-              <a:t> across restarts is tricky</a:t>
-            </a:r>
-          </a:p>
-          <a:p>
-            <a:pPr lvl="1"/>
-            <a:r>
-              <a:rPr lang="en-US" dirty="0" smtClean="0"/>
-              <a:t>Cobble together many methods to collect state</a:t>
-            </a:r>
-          </a:p>
-          <a:p>
-            <a:pPr lvl="1"/>
-            <a:r>
-              <a:rPr lang="en-US" dirty="0" smtClean="0"/>
-              <a:t>Pickle state as a string and add it to restart files</a:t>
-            </a:r>
-          </a:p>
-          <a:p>
-            <a:pPr lvl="1"/>
-            <a:r>
-              <a:rPr lang="en-US" dirty="0" smtClean="0"/>
-              <a:t>Some objects pickle but do not </a:t>
-            </a:r>
-            <a:r>
-              <a:rPr lang="en-US" dirty="0" err="1" smtClean="0"/>
-              <a:t>unpickle</a:t>
-            </a:r>
-            <a:r>
-              <a:rPr lang="en-US" dirty="0" smtClean="0"/>
-              <a:t>!</a:t>
-            </a:r>
-          </a:p>
-          <a:p>
-            <a:pPr lvl="1"/>
-            <a:endParaRPr lang="en-US" dirty="0" smtClean="0"/>
-          </a:p>
-          <a:p>
-            <a:r>
-              <a:rPr lang="en-US" dirty="0" smtClean="0"/>
-              <a:t>If your program uses different indexing than Python, resist the urge to emulate your program’s indexing in Python</a:t>
-            </a:r>
-          </a:p>
-        </p:txBody>
-      </p:sp>
-    </p:spTree>
-  </p:cSld>
-  <p:clrMapOvr>
-    <a:masterClrMapping/>
-  </p:clrMapOvr>
-</p:sld>
-</file>
-
-<file path=ppt/slides/slide22.xml><?xml version="1.0" encoding="utf-8"?>
-<p:sld xmlns:a="http://schemas.openxmlformats.org/drawingml/2006/main" xmlns:r="http://schemas.openxmlformats.org/officeDocument/2006/relationships" xmlns:mc="http://schemas.openxmlformats.org/markup-compatibility/2006" xmlns:mv="urn:schemas-microsoft-com:mac:vml" xmlns:p="http://schemas.openxmlformats.org/presentationml/2006/main" mc:Ignorable="mv" mc:PreserveAttributes="mv:*">
-  <p:cSld>
-    <p:spTree>
-      <p:nvGrpSpPr>
-        <p:cNvPr id="1" name=""/>
-        <p:cNvGrpSpPr/>
-        <p:nvPr/>
-      </p:nvGrpSpPr>
-      <p:grpSpPr>
-        <a:xfrm>
-          <a:off x="0" y="0"/>
-          <a:ext cx="0" cy="0"/>
-          <a:chOff x="0" y="0"/>
-          <a:chExt cx="0" cy="0"/>
-        </a:xfrm>
-      </p:grpSpPr>
-      <p:sp>
-        <p:nvSpPr>
-          <p:cNvPr id="2" name="Title 1"/>
-          <p:cNvSpPr>
-            <a:spLocks noGrp="1"/>
-          </p:cNvSpPr>
-          <p:nvPr>
-            <p:ph type="title"/>
-          </p:nvPr>
-        </p:nvSpPr>
-        <p:spPr/>
-        <p:txBody>
-          <a:bodyPr/>
-          <a:lstStyle/>
-          <a:p>
-            <a:r>
-              <a:rPr lang="en-US" dirty="0" smtClean="0"/>
-              <a:t>Embedded Python interpreter enables “introspective” programs without major software development effort</a:t>
-            </a:r>
-            <a:endParaRPr lang="en-US" dirty="0"/>
-          </a:p>
-        </p:txBody>
-      </p:sp>
-      <p:sp>
-        <p:nvSpPr>
-          <p:cNvPr id="3" name="Content Placeholder 2"/>
-          <p:cNvSpPr>
-            <a:spLocks noGrp="1"/>
-          </p:cNvSpPr>
-          <p:nvPr>
-            <p:ph idx="1"/>
-          </p:nvPr>
-        </p:nvSpPr>
-        <p:spPr>
-          <a:xfrm>
-            <a:off x="212725" y="1340069"/>
-            <a:ext cx="8778875" cy="4946431"/>
-          </a:xfrm>
-        </p:spPr>
-        <p:txBody>
-          <a:bodyPr/>
-          <a:lstStyle/>
-          <a:p>
-            <a:r>
-              <a:rPr lang="en-US" dirty="0" smtClean="0"/>
-              <a:t>Shock tracking and triggers</a:t>
-            </a:r>
-          </a:p>
-          <a:p>
-            <a:r>
-              <a:rPr lang="en-US" dirty="0" smtClean="0"/>
-              <a:t>Dynamically changing dump frequency</a:t>
-            </a:r>
-          </a:p>
-          <a:p>
-            <a:r>
-              <a:rPr lang="en-US" dirty="0" smtClean="0"/>
-              <a:t>Areal density (ρR) monitors and triggers</a:t>
-            </a:r>
-            <a:endParaRPr lang="en-US" dirty="0"/>
-          </a:p>
-        </p:txBody>
-      </p:sp>
-    </p:spTree>
-  </p:cSld>
-  <p:clrMapOvr>
-    <a:masterClrMapping/>
-  </p:clrMapOvr>
-</p:sld>
-</file>
-
-<file path=ppt/slides/slide23.xml><?xml version="1.0" encoding="utf-8"?>
-<p:sld xmlns:a="http://schemas.openxmlformats.org/drawingml/2006/main" xmlns:r="http://schemas.openxmlformats.org/officeDocument/2006/relationships" xmlns:mc="http://schemas.openxmlformats.org/markup-compatibility/2006" xmlns:mv="urn:schemas-microsoft-com:mac:vml" xmlns:p="http://schemas.openxmlformats.org/presentationml/2006/main" mc:Ignorable="mv" mc:PreserveAttributes="mv:*">
-  <p:cSld>
-    <p:spTree>
-      <p:nvGrpSpPr>
-        <p:cNvPr id="1" name=""/>
-        <p:cNvGrpSpPr/>
-        <p:nvPr/>
-      </p:nvGrpSpPr>
-      <p:grpSpPr>
-        <a:xfrm>
-          <a:off x="0" y="0"/>
-          <a:ext cx="0" cy="0"/>
-          <a:chOff x="0" y="0"/>
-          <a:chExt cx="0" cy="0"/>
-        </a:xfrm>
-      </p:grpSpPr>
-      <p:sp>
-        <p:nvSpPr>
-          <p:cNvPr id="2" name="Title 1"/>
-          <p:cNvSpPr>
-            <a:spLocks noGrp="1"/>
-          </p:cNvSpPr>
-          <p:nvPr>
-            <p:ph type="title"/>
-          </p:nvPr>
-        </p:nvSpPr>
-        <p:spPr/>
-        <p:txBody>
-          <a:bodyPr/>
-          <a:lstStyle/>
-          <a:p>
-            <a:r>
-              <a:rPr lang="en-US" dirty="0" smtClean="0"/>
-              <a:t>Summary</a:t>
-            </a:r>
-            <a:endParaRPr lang="en-US" dirty="0"/>
-          </a:p>
-        </p:txBody>
-      </p:sp>
-      <p:sp>
-        <p:nvSpPr>
-          <p:cNvPr id="3" name="Content Placeholder 2"/>
-          <p:cNvSpPr>
-            <a:spLocks noGrp="1"/>
-          </p:cNvSpPr>
-          <p:nvPr>
-            <p:ph idx="1"/>
-          </p:nvPr>
-        </p:nvSpPr>
-        <p:spPr>
-          <a:xfrm>
-            <a:off x="212725" y="1212623"/>
-            <a:ext cx="8778875" cy="5073878"/>
-          </a:xfrm>
-        </p:spPr>
-        <p:txBody>
-          <a:bodyPr/>
-          <a:lstStyle/>
-          <a:p>
-            <a:r>
-              <a:rPr lang="en-US" dirty="0" smtClean="0"/>
-              <a:t>Manually tuning a laser pulse to a specific target is normally a labor intensive, high latency process</a:t>
-            </a:r>
-          </a:p>
-          <a:p>
-            <a:r>
-              <a:rPr lang="en-US" dirty="0" smtClean="0"/>
-              <a:t>Tuning can be automated given a sufficiently unambiguous description of “tuned”</a:t>
-            </a:r>
-          </a:p>
-          <a:p>
-            <a:r>
-              <a:rPr lang="en-US" dirty="0" smtClean="0"/>
-              <a:t>For laser shock ignition targets, the initial picket pulse sets the shock breakout time and other pre-pulse shocks should break out as close to this shock without changing the overall breakout time</a:t>
-            </a:r>
-          </a:p>
-          <a:p>
-            <a:r>
-              <a:rPr lang="en-US" dirty="0" smtClean="0"/>
-              <a:t>Main pulse should maximize areal density as to maximize burn fraction when ignited</a:t>
-            </a:r>
-          </a:p>
-          <a:p>
-            <a:r>
-              <a:rPr lang="en-US" dirty="0" smtClean="0"/>
-              <a:t>Igniter shock should be timed to maximize TN yield</a:t>
-            </a:r>
-          </a:p>
-          <a:p>
-            <a:r>
-              <a:rPr lang="en-US" dirty="0" smtClean="0"/>
-              <a:t>Timing algorithm assumes interaction between different pulse features is primarily hydrodynamic, allowing for tuning method to ignore interaction between features</a:t>
-            </a:r>
-            <a:endParaRPr lang="en-US" dirty="0"/>
-          </a:p>
-        </p:txBody>
-      </p:sp>
-    </p:spTree>
-  </p:cSld>
-  <p:clrMapOvr>
-    <a:masterClrMapping/>
-  </p:clrMapOvr>
-</p:sld>
-</file>
-
 <file path=ppt/slides/slide24.xml><?xml version="1.0" encoding="utf-8"?>
 <p:sld xmlns:a="http://schemas.openxmlformats.org/drawingml/2006/main" xmlns:r="http://schemas.openxmlformats.org/officeDocument/2006/relationships" xmlns:mc="http://schemas.openxmlformats.org/markup-compatibility/2006" xmlns:mv="urn:schemas-microsoft-com:mac:vml" xmlns:p="http://schemas.openxmlformats.org/presentationml/2006/main" mc:Ignorable="mv" mc:PreserveAttributes="mv:*">
   <p:cSld>
@@ -10117,7 +10289,209 @@
           <a:p>
             <a:r>
               <a:rPr lang="en-US" dirty="0" smtClean="0"/>
-              <a:t>We use a parallel 8-wide binary search method to maximize areal density and yield</a:t>
+              <a:t>Embedded Python interpreter enables “introspective” programs without major software development effort</a:t>
+            </a:r>
+            <a:endParaRPr lang="en-US" dirty="0"/>
+          </a:p>
+        </p:txBody>
+      </p:sp>
+      <p:sp>
+        <p:nvSpPr>
+          <p:cNvPr id="3" name="Content Placeholder 2"/>
+          <p:cNvSpPr>
+            <a:spLocks noGrp="1"/>
+          </p:cNvSpPr>
+          <p:nvPr>
+            <p:ph idx="1"/>
+          </p:nvPr>
+        </p:nvSpPr>
+        <p:spPr>
+          <a:xfrm>
+            <a:off x="212725" y="1340069"/>
+            <a:ext cx="8778875" cy="4946431"/>
+          </a:xfrm>
+        </p:spPr>
+        <p:txBody>
+          <a:bodyPr/>
+          <a:lstStyle/>
+          <a:p>
+            <a:r>
+              <a:rPr lang="en-US" dirty="0" smtClean="0"/>
+              <a:t>Shock tracking and triggers</a:t>
+            </a:r>
+          </a:p>
+          <a:p>
+            <a:r>
+              <a:rPr lang="en-US" dirty="0" smtClean="0"/>
+              <a:t>Dynamically changing dump frequency</a:t>
+            </a:r>
+          </a:p>
+          <a:p>
+            <a:r>
+              <a:rPr lang="en-US" dirty="0" smtClean="0"/>
+              <a:t>Areal density (ρR) monitors and triggers</a:t>
+            </a:r>
+            <a:endParaRPr lang="en-US" dirty="0"/>
+          </a:p>
+        </p:txBody>
+      </p:sp>
+    </p:spTree>
+  </p:cSld>
+  <p:clrMapOvr>
+    <a:masterClrMapping/>
+  </p:clrMapOvr>
+</p:sld>
+</file>
+
+<file path=ppt/slides/slide25.xml><?xml version="1.0" encoding="utf-8"?>
+<p:sld xmlns:a="http://schemas.openxmlformats.org/drawingml/2006/main" xmlns:r="http://schemas.openxmlformats.org/officeDocument/2006/relationships" xmlns:mc="http://schemas.openxmlformats.org/markup-compatibility/2006" xmlns:mv="urn:schemas-microsoft-com:mac:vml" xmlns:p="http://schemas.openxmlformats.org/presentationml/2006/main" mc:Ignorable="mv" mc:PreserveAttributes="mv:*">
+  <p:cSld>
+    <p:spTree>
+      <p:nvGrpSpPr>
+        <p:cNvPr id="1" name=""/>
+        <p:cNvGrpSpPr/>
+        <p:nvPr/>
+      </p:nvGrpSpPr>
+      <p:grpSpPr>
+        <a:xfrm>
+          <a:off x="0" y="0"/>
+          <a:ext cx="0" cy="0"/>
+          <a:chOff x="0" y="0"/>
+          <a:chExt cx="0" cy="0"/>
+        </a:xfrm>
+      </p:grpSpPr>
+      <p:sp>
+        <p:nvSpPr>
+          <p:cNvPr id="2" name="Title 1"/>
+          <p:cNvSpPr>
+            <a:spLocks noGrp="1"/>
+          </p:cNvSpPr>
+          <p:nvPr>
+            <p:ph type="title"/>
+          </p:nvPr>
+        </p:nvSpPr>
+        <p:spPr/>
+        <p:txBody>
+          <a:bodyPr/>
+          <a:lstStyle/>
+          <a:p>
+            <a:r>
+              <a:rPr lang="en-US" dirty="0" smtClean="0"/>
+              <a:t>Summary</a:t>
+            </a:r>
+            <a:endParaRPr lang="en-US" dirty="0"/>
+          </a:p>
+        </p:txBody>
+      </p:sp>
+      <p:sp>
+        <p:nvSpPr>
+          <p:cNvPr id="3" name="Content Placeholder 2"/>
+          <p:cNvSpPr>
+            <a:spLocks noGrp="1"/>
+          </p:cNvSpPr>
+          <p:nvPr>
+            <p:ph idx="1"/>
+          </p:nvPr>
+        </p:nvSpPr>
+        <p:spPr>
+          <a:xfrm>
+            <a:off x="212725" y="1212623"/>
+            <a:ext cx="8778875" cy="5073878"/>
+          </a:xfrm>
+        </p:spPr>
+        <p:txBody>
+          <a:bodyPr/>
+          <a:lstStyle/>
+          <a:p>
+            <a:r>
+              <a:rPr lang="en-US" dirty="0" smtClean="0"/>
+              <a:t>Manually tuning a laser pulse to a specific target is normally a labor intensive, high latency process</a:t>
+            </a:r>
+          </a:p>
+          <a:p>
+            <a:r>
+              <a:rPr lang="en-US" dirty="0" smtClean="0"/>
+              <a:t>Tuning can be automated given a sufficiently unambiguous description of “tuned”</a:t>
+            </a:r>
+          </a:p>
+          <a:p>
+            <a:r>
+              <a:rPr lang="en-US" dirty="0" smtClean="0"/>
+              <a:t>For laser shock ignition targets, the initial picket pulse sets the shock breakout time and other pre-pulse shocks should break out as close to this shock without changing the overall breakout time</a:t>
+            </a:r>
+          </a:p>
+          <a:p>
+            <a:r>
+              <a:rPr lang="en-US" dirty="0" smtClean="0"/>
+              <a:t>Main pulse should maximize areal density as to maximize burn fraction when ignited</a:t>
+            </a:r>
+          </a:p>
+          <a:p>
+            <a:r>
+              <a:rPr lang="en-US" dirty="0" smtClean="0"/>
+              <a:t>Igniter shock should be timed to maximize TN yield</a:t>
+            </a:r>
+          </a:p>
+          <a:p>
+            <a:r>
+              <a:rPr lang="en-US" dirty="0" smtClean="0"/>
+              <a:t>Timing algorithm assumes interaction between different pulse features is primarily hydrodynamic, allowing for tuning method to ignore interaction between features</a:t>
+            </a:r>
+            <a:endParaRPr lang="en-US" dirty="0"/>
+          </a:p>
+        </p:txBody>
+      </p:sp>
+    </p:spTree>
+  </p:cSld>
+  <p:clrMapOvr>
+    <a:masterClrMapping/>
+  </p:clrMapOvr>
+</p:sld>
+</file>
+
+<file path=ppt/slides/slide26.xml><?xml version="1.0" encoding="utf-8"?>
+<p:sld xmlns:a="http://schemas.openxmlformats.org/drawingml/2006/main" xmlns:r="http://schemas.openxmlformats.org/officeDocument/2006/relationships" xmlns:mc="http://schemas.openxmlformats.org/markup-compatibility/2006" xmlns:mv="urn:schemas-microsoft-com:mac:vml" xmlns:p="http://schemas.openxmlformats.org/presentationml/2006/main" mc:Ignorable="mv" mc:PreserveAttributes="mv:*">
+  <p:cSld>
+    <p:spTree>
+      <p:nvGrpSpPr>
+        <p:cNvPr id="1" name=""/>
+        <p:cNvGrpSpPr/>
+        <p:nvPr/>
+      </p:nvGrpSpPr>
+      <p:grpSpPr>
+        <a:xfrm>
+          <a:off x="0" y="0"/>
+          <a:ext cx="0" cy="0"/>
+          <a:chOff x="0" y="0"/>
+          <a:chExt cx="0" cy="0"/>
+        </a:xfrm>
+      </p:grpSpPr>
+      <p:sp>
+        <p:nvSpPr>
+          <p:cNvPr id="2" name="Title 1"/>
+          <p:cNvSpPr>
+            <a:spLocks noGrp="1"/>
+          </p:cNvSpPr>
+          <p:nvPr>
+            <p:ph type="title"/>
+          </p:nvPr>
+        </p:nvSpPr>
+        <p:spPr/>
+        <p:txBody>
+          <a:bodyPr/>
+          <a:lstStyle/>
+          <a:p>
+            <a:r>
+              <a:rPr lang="en-US" dirty="0" smtClean="0"/>
+              <a:t>Optimizations </a:t>
+            </a:r>
+            <a:r>
+              <a:rPr lang="en-US" dirty="0" smtClean="0"/>
+              <a:t>use a parallel 8-wide</a:t>
+            </a:r>
+            <a:r>
+              <a:rPr lang="en-US" dirty="0" smtClean="0"/>
+              <a:t> direct search method</a:t>
             </a:r>
             <a:endParaRPr lang="en-US" dirty="0"/>
           </a:p>
@@ -10166,7 +10540,15 @@
             </a:br>
             <a:r>
               <a:rPr lang="en-US" dirty="0" smtClean="0"/>
-              <a:t> of generations rather than number of </a:t>
+              <a:t> of</a:t>
+            </a:r>
+            <a:r>
+              <a:rPr lang="en-US" dirty="0" smtClean="0"/>
+              <a:t> iterations rather </a:t>
+            </a:r>
+            <a:r>
+              <a:rPr lang="en-US" dirty="0" smtClean="0"/>
+              <a:t>than number of </a:t>
             </a:r>
             <a:br>
               <a:rPr lang="en-US" dirty="0" smtClean="0"/>
@@ -10256,7 +10638,15 @@
             </a:r>
             <a:r>
               <a:rPr lang="en-US" dirty="0" smtClean="0"/>
-              <a:t> typically takes 2-3 generations</a:t>
+              <a:t> typically takes</a:t>
+            </a:r>
+            <a:r>
+              <a:rPr lang="en-US" dirty="0" smtClean="0"/>
+              <a:t> 3-4 </a:t>
+            </a:r>
+            <a:r>
+              <a:rPr lang="en-US" dirty="0" smtClean="0"/>
+              <a:t>generations</a:t>
             </a:r>
           </a:p>
           <a:p>
@@ -10378,7 +10768,7 @@
         <mc:AlternateContent>
           <mc:Choice xmlns:ma="http://schemas.microsoft.com/office/mac/drawingml/2008/main" Requires="ma">
             <p:blipFill>
-              <a:blip r:embed="rId2"/>
+              <a:blip r:embed="rId3"/>
               <a:srcRect l="3425" t="7516" b="2510"/>
               <a:stretch>
                 <a:fillRect/>
@@ -10387,7 +10777,7 @@
           </mc:Choice>
           <mc:Fallback>
             <p:blipFill>
-              <a:blip r:embed="rId3"/>
+              <a:blip r:embed="rId4"/>
               <a:srcRect l="3425" t="7516" b="2510"/>
               <a:stretch>
                 <a:fillRect/>
@@ -10405,15 +10795,276 @@
           </a:prstGeom>
         </p:spPr>
       </p:pic>
+      <p:pic>
+        <p:nvPicPr>
+          <p:cNvPr id="4" name="mats.avi">
+            <a:hlinkClick r:id="" action="ppaction://media"/>
+          </p:cNvPr>
+          <p:cNvPicPr/>
+          <p:nvPr>
+            <a:videoFile r:link="rId1"/>
+          </p:nvPr>
+        </p:nvPicPr>
+        <p:blipFill>
+          <a:blip r:embed="rId5"/>
+          <a:stretch>
+            <a:fillRect/>
+          </a:stretch>
+        </p:blipFill>
+        <p:spPr>
+          <a:xfrm>
+            <a:off x="0" y="0"/>
+            <a:ext cx="9144000" cy="6858000"/>
+          </a:xfrm>
+          <a:prstGeom prst="rect">
+            <a:avLst/>
+          </a:prstGeom>
+        </p:spPr>
+      </p:pic>
     </p:spTree>
   </p:cSld>
   <p:clrMapOvr>
     <a:masterClrMapping/>
   </p:clrMapOvr>
+  <p:timing>
+    <p:tnLst>
+      <p:par>
+        <p:cTn id="1" dur="indefinite" restart="never" nodeType="tmRoot">
+          <p:childTnLst>
+            <p:seq concurrent="1" nextAc="seek">
+              <p:cTn id="2" restart="whenNotActive" fill="hold" evtFilter="cancelBubble" nodeType="interactiveSeq">
+                <p:stCondLst>
+                  <p:cond evt="onClick" delay="0">
+                    <p:tgtEl>
+                      <p:spTgt spid="4"/>
+                    </p:tgtEl>
+                  </p:cond>
+                </p:stCondLst>
+                <p:endSync evt="end" delay="0">
+                  <p:rtn val="all"/>
+                </p:endSync>
+                <p:childTnLst>
+                  <p:par>
+                    <p:cTn id="3" fill="hold">
+                      <p:stCondLst>
+                        <p:cond delay="0"/>
+                      </p:stCondLst>
+                      <p:childTnLst>
+                        <p:par>
+                          <p:cTn id="4" fill="hold">
+                            <p:stCondLst>
+                              <p:cond delay="0"/>
+                            </p:stCondLst>
+                            <p:childTnLst>
+                              <p:par>
+                                <p:cTn id="5" presetID="2" presetClass="mediacall" presetSubtype="0" fill="hold" nodeType="clickEffect">
+                                  <p:stCondLst>
+                                    <p:cond delay="0"/>
+                                  </p:stCondLst>
+                                  <p:childTnLst>
+                                    <p:cmd type="call" cmd="togglePause">
+                                      <p:cBhvr>
+                                        <p:cTn id="6" dur="1" fill="hold"/>
+                                        <p:tgtEl>
+                                          <p:spTgt spid="4"/>
+                                        </p:tgtEl>
+                                      </p:cBhvr>
+                                    </p:cmd>
+                                  </p:childTnLst>
+                                </p:cTn>
+                              </p:par>
+                            </p:childTnLst>
+                          </p:cTn>
+                        </p:par>
+                      </p:childTnLst>
+                    </p:cTn>
+                  </p:par>
+                </p:childTnLst>
+              </p:cTn>
+              <p:nextCondLst>
+                <p:cond evt="onClick" delay="0">
+                  <p:tgtEl>
+                    <p:spTgt spid="4"/>
+                  </p:tgtEl>
+                </p:cond>
+              </p:nextCondLst>
+            </p:seq>
+            <p:video>
+              <p:cMediaNode>
+                <p:cTn id="7" fill="hold" display="0">
+                  <p:stCondLst>
+                    <p:cond delay="indefinite"/>
+                  </p:stCondLst>
+                  <p:endCondLst>
+                    <p:cond evt="onNext" delay="0">
+                      <p:tgtEl>
+                        <p:sldTgt/>
+                      </p:tgtEl>
+                    </p:cond>
+                    <p:cond evt="onPrev" delay="0">
+                      <p:tgtEl>
+                        <p:sldTgt/>
+                      </p:tgtEl>
+                    </p:cond>
+                  </p:endCondLst>
+                </p:cTn>
+                <p:tgtEl>
+                  <p:spTgt spid="4"/>
+                </p:tgtEl>
+              </p:cMediaNode>
+            </p:video>
+          </p:childTnLst>
+        </p:cTn>
+      </p:par>
+    </p:tnLst>
+  </p:timing>
 </p:sld>
 </file>
 
 <file path=ppt/slides/slide4.xml><?xml version="1.0" encoding="utf-8"?>
+<p:sld xmlns:a="http://schemas.openxmlformats.org/drawingml/2006/main" xmlns:r="http://schemas.openxmlformats.org/officeDocument/2006/relationships" xmlns:mc="http://schemas.openxmlformats.org/markup-compatibility/2006" xmlns:mv="urn:schemas-microsoft-com:mac:vml" xmlns:p="http://schemas.openxmlformats.org/presentationml/2006/main" mc:Ignorable="mv" mc:PreserveAttributes="mv:*">
+  <p:cSld>
+    <p:spTree>
+      <p:nvGrpSpPr>
+        <p:cNvPr id="1" name=""/>
+        <p:cNvGrpSpPr/>
+        <p:nvPr/>
+      </p:nvGrpSpPr>
+      <p:grpSpPr>
+        <a:xfrm>
+          <a:off x="0" y="0"/>
+          <a:ext cx="0" cy="0"/>
+          <a:chOff x="0" y="0"/>
+          <a:chExt cx="0" cy="0"/>
+        </a:xfrm>
+      </p:grpSpPr>
+      <p:pic>
+        <p:nvPicPr>
+          <p:cNvPr id="2" name="logden.avi">
+            <a:hlinkClick r:id="" action="ppaction://media"/>
+          </p:cNvPr>
+          <p:cNvPicPr/>
+          <p:nvPr>
+            <a:videoFile r:link="rId1"/>
+          </p:nvPr>
+        </p:nvPicPr>
+        <p:blipFill>
+          <a:blip r:embed="rId3"/>
+          <a:stretch>
+            <a:fillRect/>
+          </a:stretch>
+        </p:blipFill>
+        <p:spPr>
+          <a:xfrm>
+            <a:off x="0" y="0"/>
+            <a:ext cx="9144000" cy="6858000"/>
+          </a:xfrm>
+          <a:prstGeom prst="rect">
+            <a:avLst/>
+          </a:prstGeom>
+        </p:spPr>
+      </p:pic>
+    </p:spTree>
+  </p:cSld>
+  <p:clrMapOvr>
+    <a:masterClrMapping/>
+  </p:clrMapOvr>
+  <p:timing>
+    <p:tnLst>
+      <p:par>
+        <p:cTn id="1" dur="indefinite" restart="never" nodeType="tmRoot">
+          <p:childTnLst>
+            <p:seq concurrent="1" nextAc="seek">
+              <p:cTn id="2" restart="whenNotActive" fill="hold" evtFilter="cancelBubble" nodeType="interactiveSeq">
+                <p:stCondLst>
+                  <p:cond evt="onClick" delay="0">
+                    <p:tgtEl>
+                      <p:spTgt spid="2"/>
+                    </p:tgtEl>
+                  </p:cond>
+                </p:stCondLst>
+                <p:endSync evt="end" delay="0">
+                  <p:rtn val="all"/>
+                </p:endSync>
+                <p:childTnLst>
+                  <p:par>
+                    <p:cTn id="3" fill="hold">
+                      <p:stCondLst>
+                        <p:cond delay="0"/>
+                      </p:stCondLst>
+                      <p:childTnLst>
+                        <p:par>
+                          <p:cTn id="4" fill="hold">
+                            <p:stCondLst>
+                              <p:cond delay="0"/>
+                            </p:stCondLst>
+                            <p:childTnLst>
+                              <p:par>
+                                <p:cTn id="5" presetID="2" presetClass="mediacall" presetSubtype="0" fill="hold" nodeType="clickEffect">
+                                  <p:stCondLst>
+                                    <p:cond delay="0"/>
+                                  </p:stCondLst>
+                                  <p:childTnLst>
+                                    <p:cmd type="call" cmd="togglePause">
+                                      <p:cBhvr>
+                                        <p:cTn id="6" dur="1" fill="hold"/>
+                                        <p:tgtEl>
+                                          <p:spTgt spid="2"/>
+                                        </p:tgtEl>
+                                      </p:cBhvr>
+                                    </p:cmd>
+                                  </p:childTnLst>
+                                </p:cTn>
+                              </p:par>
+                            </p:childTnLst>
+                          </p:cTn>
+                        </p:par>
+                      </p:childTnLst>
+                    </p:cTn>
+                  </p:par>
+                </p:childTnLst>
+              </p:cTn>
+              <p:nextCondLst>
+                <p:cond evt="onClick" delay="0">
+                  <p:tgtEl>
+                    <p:spTgt spid="2"/>
+                  </p:tgtEl>
+                </p:cond>
+              </p:nextCondLst>
+            </p:seq>
+            <p:video>
+              <p:cMediaNode>
+                <p:cTn id="7" fill="hold" display="0">
+                  <p:stCondLst>
+                    <p:cond delay="indefinite"/>
+                  </p:stCondLst>
+                  <p:endCondLst>
+                    <p:cond evt="onNext" delay="0">
+                      <p:tgtEl>
+                        <p:sldTgt/>
+                      </p:tgtEl>
+                    </p:cond>
+                    <p:cond evt="onPrev" delay="0">
+                      <p:tgtEl>
+                        <p:sldTgt/>
+                      </p:tgtEl>
+                    </p:cond>
+                  </p:endCondLst>
+                </p:cTn>
+                <p:tgtEl>
+                  <p:spTgt spid="2"/>
+                </p:tgtEl>
+              </p:cMediaNode>
+            </p:video>
+          </p:childTnLst>
+        </p:cTn>
+      </p:par>
+    </p:tnLst>
+  </p:timing>
+</p:sld>
+</file>
+
+<file path=ppt/slides/slide5.xml><?xml version="1.0" encoding="utf-8"?>
 <p:sld xmlns:a="http://schemas.openxmlformats.org/drawingml/2006/main" xmlns:r="http://schemas.openxmlformats.org/officeDocument/2006/relationships" xmlns:mc="http://schemas.openxmlformats.org/markup-compatibility/2006" xmlns:mv="urn:schemas-microsoft-com:mac:vml" xmlns:p="http://schemas.openxmlformats.org/presentationml/2006/main" mc:Ignorable="mv" mc:PreserveAttributes="mv:*">
   <p:cSld>
     <p:spTree>
@@ -10548,10 +11199,17 @@
   <p:clrMapOvr>
     <a:masterClrMapping/>
   </p:clrMapOvr>
+  <p:timing>
+    <p:tnLst>
+      <p:par>
+        <p:cTn id="1" dur="indefinite" restart="never" nodeType="tmRoot"/>
+      </p:par>
+    </p:tnLst>
+  </p:timing>
 </p:sld>
 </file>
 
-<file path=ppt/slides/slide5.xml><?xml version="1.0" encoding="utf-8"?>
+<file path=ppt/slides/slide6.xml><?xml version="1.0" encoding="utf-8"?>
 <p:sld xmlns:a="http://schemas.openxmlformats.org/drawingml/2006/main" xmlns:r="http://schemas.openxmlformats.org/officeDocument/2006/relationships" xmlns:mc="http://schemas.openxmlformats.org/markup-compatibility/2006" xmlns:mv="urn:schemas-microsoft-com:mac:vml" xmlns:p="http://schemas.openxmlformats.org/presentationml/2006/main" mc:Ignorable="mv" mc:PreserveAttributes="mv:*">
   <p:cSld>
     <p:spTree>
@@ -10686,10 +11344,17 @@
   <p:clrMapOvr>
     <a:masterClrMapping/>
   </p:clrMapOvr>
+  <p:timing>
+    <p:tnLst>
+      <p:par>
+        <p:cTn id="1" dur="indefinite" restart="never" nodeType="tmRoot"/>
+      </p:par>
+    </p:tnLst>
+  </p:timing>
 </p:sld>
 </file>
 
-<file path=ppt/slides/slide6.xml><?xml version="1.0" encoding="utf-8"?>
+<file path=ppt/slides/slide7.xml><?xml version="1.0" encoding="utf-8"?>
 <p:sld xmlns:a="http://schemas.openxmlformats.org/drawingml/2006/main" xmlns:r="http://schemas.openxmlformats.org/officeDocument/2006/relationships" xmlns:mc="http://schemas.openxmlformats.org/markup-compatibility/2006" xmlns:mv="urn:schemas-microsoft-com:mac:vml" xmlns:p="http://schemas.openxmlformats.org/presentationml/2006/main" mc:Ignorable="mv" mc:PreserveAttributes="mv:*">
   <p:cSld>
     <p:spTree>
@@ -10851,10 +11516,383 @@
   <p:clrMapOvr>
     <a:masterClrMapping/>
   </p:clrMapOvr>
+  <p:timing>
+    <p:tnLst>
+      <p:par>
+        <p:cTn id="1" dur="indefinite" restart="never" nodeType="tmRoot"/>
+      </p:par>
+    </p:tnLst>
+  </p:timing>
 </p:sld>
 </file>
 
-<file path=ppt/slides/slide7.xml><?xml version="1.0" encoding="utf-8"?>
+<file path=ppt/slides/slide8.xml><?xml version="1.0" encoding="utf-8"?>
+<p:sld xmlns:a="http://schemas.openxmlformats.org/drawingml/2006/main" xmlns:r="http://schemas.openxmlformats.org/officeDocument/2006/relationships" xmlns:mc="http://schemas.openxmlformats.org/markup-compatibility/2006" xmlns:mv="urn:schemas-microsoft-com:mac:vml" xmlns:p="http://schemas.openxmlformats.org/presentationml/2006/main" mc:Ignorable="mv" mc:PreserveAttributes="mv:*">
+  <p:cSld>
+    <p:spTree>
+      <p:nvGrpSpPr>
+        <p:cNvPr id="1" name=""/>
+        <p:cNvGrpSpPr/>
+        <p:nvPr/>
+      </p:nvGrpSpPr>
+      <p:grpSpPr>
+        <a:xfrm>
+          <a:off x="0" y="0"/>
+          <a:ext cx="0" cy="0"/>
+          <a:chOff x="0" y="0"/>
+          <a:chExt cx="0" cy="0"/>
+        </a:xfrm>
+      </p:grpSpPr>
+      <p:sp>
+        <p:nvSpPr>
+          <p:cNvPr id="2" name="Title 1"/>
+          <p:cNvSpPr>
+            <a:spLocks noGrp="1"/>
+          </p:cNvSpPr>
+          <p:nvPr>
+            <p:ph type="title"/>
+          </p:nvPr>
+        </p:nvSpPr>
+        <p:spPr/>
+        <p:txBody>
+          <a:bodyPr/>
+          <a:lstStyle/>
+          <a:p>
+            <a:r>
+              <a:rPr lang="en-US" dirty="0" smtClean="0"/>
+              <a:t>Build a tuned pulse by appending optimized the pieces</a:t>
+            </a:r>
+            <a:endParaRPr lang="en-US" dirty="0"/>
+          </a:p>
+        </p:txBody>
+      </p:sp>
+      <p:sp>
+        <p:nvSpPr>
+          <p:cNvPr id="3" name="Content Placeholder 2"/>
+          <p:cNvSpPr>
+            <a:spLocks noGrp="1"/>
+          </p:cNvSpPr>
+          <p:nvPr>
+            <p:ph idx="1"/>
+          </p:nvPr>
+        </p:nvSpPr>
+        <p:spPr>
+          <a:xfrm>
+            <a:off x="212725" y="1233003"/>
+            <a:ext cx="8778875" cy="5053497"/>
+          </a:xfrm>
+        </p:spPr>
+        <p:txBody>
+          <a:bodyPr/>
+          <a:lstStyle/>
+          <a:p>
+            <a:r>
+              <a:rPr lang="en-US" dirty="0" smtClean="0"/>
+              <a:t>Pulse start times and powers must be adjusted to have the correct behavior</a:t>
+            </a:r>
+          </a:p>
+          <a:p>
+            <a:r>
+              <a:rPr lang="en-US" dirty="0" smtClean="0"/>
+              <a:t>Adjusting (“tuning”) by hand has high latency and is labor intensive</a:t>
+            </a:r>
+          </a:p>
+          <a:p>
+            <a:r>
+              <a:rPr lang="en-US" dirty="0" smtClean="0"/>
+              <a:t>We can construct objective functions that implement the “eye balling” heuristics that people use when manually tuning</a:t>
+            </a:r>
+          </a:p>
+          <a:p>
+            <a:r>
+              <a:rPr lang="en-US" dirty="0" smtClean="0"/>
+              <a:t>Construct a tuned pulse by appending tuned pieces</a:t>
+            </a:r>
+            <a:endParaRPr lang="en-US" dirty="0"/>
+          </a:p>
+        </p:txBody>
+      </p:sp>
+      <p:sp>
+        <p:nvSpPr>
+          <p:cNvPr id="4" name="TextBox 3"/>
+          <p:cNvSpPr txBox="1"/>
+          <p:nvPr/>
+        </p:nvSpPr>
+        <p:spPr>
+          <a:xfrm>
+            <a:off x="315104" y="3141360"/>
+            <a:ext cx="8670149" cy="1938992"/>
+          </a:xfrm>
+          <a:prstGeom prst="rect">
+            <a:avLst/>
+          </a:prstGeom>
+          <a:noFill/>
+        </p:spPr>
+        <p:txBody>
+          <a:bodyPr wrap="square" rtlCol="0">
+            <a:spAutoFit/>
+          </a:bodyPr>
+          <a:lstStyle/>
+          <a:p>
+            <a:pPr algn="l"/>
+            <a:r>
+              <a:rPr lang="en-US" sz="2000" b="0" dirty="0" smtClean="0">
+                <a:latin typeface="Inconsolata"/>
+                <a:cs typeface="Inconsolata"/>
+              </a:rPr>
+              <a:t>tuners = [</a:t>
+            </a:r>
+            <a:r>
+              <a:rPr lang="en-US" sz="2000" b="0" dirty="0" err="1" smtClean="0">
+                <a:latin typeface="Inconsolata"/>
+                <a:cs typeface="Inconsolata"/>
+              </a:rPr>
+              <a:t>shock_sync</a:t>
+            </a:r>
+            <a:r>
+              <a:rPr lang="en-US" sz="2000" b="0" dirty="0" smtClean="0">
+                <a:latin typeface="Inconsolata"/>
+                <a:cs typeface="Inconsolata"/>
+              </a:rPr>
+              <a:t>, </a:t>
+            </a:r>
+            <a:r>
+              <a:rPr lang="en-US" sz="2000" b="0" dirty="0" err="1" smtClean="0">
+                <a:latin typeface="Inconsolata"/>
+                <a:cs typeface="Inconsolata"/>
+              </a:rPr>
+              <a:t>shock_sync</a:t>
+            </a:r>
+            <a:r>
+              <a:rPr lang="en-US" sz="2000" b="0" dirty="0" smtClean="0">
+                <a:latin typeface="Inconsolata"/>
+                <a:cs typeface="Inconsolata"/>
+              </a:rPr>
+              <a:t>, </a:t>
+            </a:r>
+            <a:r>
+              <a:rPr lang="en-US" sz="2000" b="0" dirty="0" err="1" smtClean="0">
+                <a:latin typeface="Inconsolata"/>
+                <a:cs typeface="Inconsolata"/>
+              </a:rPr>
+              <a:t>shock_sync</a:t>
+            </a:r>
+            <a:r>
+              <a:rPr lang="en-US" sz="2000" b="0" dirty="0" smtClean="0">
+                <a:latin typeface="Inconsolata"/>
+                <a:cs typeface="Inconsolata"/>
+              </a:rPr>
+              <a:t>, </a:t>
+            </a:r>
+            <a:r>
+              <a:rPr lang="en-US" sz="2000" b="0" dirty="0" err="1" smtClean="0">
+                <a:latin typeface="Inconsolata"/>
+                <a:cs typeface="Inconsolata"/>
+              </a:rPr>
+              <a:t>max_rhor</a:t>
+            </a:r>
+            <a:r>
+              <a:rPr lang="en-US" sz="2000" b="0" dirty="0" smtClean="0">
+                <a:latin typeface="Inconsolata"/>
+                <a:cs typeface="Inconsolata"/>
+              </a:rPr>
+              <a:t>, </a:t>
+            </a:r>
+            <a:r>
+              <a:rPr lang="en-US" sz="2000" b="0" dirty="0" err="1" smtClean="0">
+                <a:latin typeface="Inconsolata"/>
+                <a:cs typeface="Inconsolata"/>
+              </a:rPr>
+              <a:t>max_yield</a:t>
+            </a:r>
+            <a:r>
+              <a:rPr lang="en-US" sz="2000" b="0" dirty="0" smtClean="0">
+                <a:latin typeface="Inconsolata"/>
+                <a:cs typeface="Inconsolata"/>
+              </a:rPr>
+              <a:t>]</a:t>
+            </a:r>
+          </a:p>
+          <a:p>
+            <a:pPr algn="l"/>
+            <a:r>
+              <a:rPr lang="en-US" sz="2000" b="0" dirty="0" smtClean="0">
+                <a:latin typeface="Inconsolata"/>
+                <a:cs typeface="Inconsolata"/>
+              </a:rPr>
+              <a:t>segments = [‘shock2’, ‘shock3’, ‘shock4’, ‘main’, ‘ignite’]</a:t>
+            </a:r>
+          </a:p>
+          <a:p>
+            <a:pPr algn="l"/>
+            <a:r>
+              <a:rPr lang="en-US" sz="2000" b="0" dirty="0" smtClean="0">
+                <a:latin typeface="Inconsolata"/>
+                <a:cs typeface="Inconsolata"/>
+              </a:rPr>
+              <a:t>laser = Laser()</a:t>
+            </a:r>
+          </a:p>
+          <a:p>
+            <a:pPr algn="l"/>
+            <a:r>
+              <a:rPr lang="en-US" sz="2000" b="0" dirty="0" smtClean="0">
+                <a:latin typeface="Inconsolata"/>
+                <a:cs typeface="Inconsolata"/>
+              </a:rPr>
+              <a:t>for tuner, </a:t>
+            </a:r>
+            <a:r>
+              <a:rPr lang="en-US" sz="2000" b="0" dirty="0" err="1" smtClean="0">
+                <a:latin typeface="Inconsolata"/>
+                <a:cs typeface="Inconsolata"/>
+              </a:rPr>
+              <a:t>seg</a:t>
+            </a:r>
+            <a:r>
+              <a:rPr lang="en-US" sz="2000" b="0" dirty="0" smtClean="0">
+                <a:latin typeface="Inconsolata"/>
+                <a:cs typeface="Inconsolata"/>
+              </a:rPr>
+              <a:t> in </a:t>
+            </a:r>
+            <a:r>
+              <a:rPr lang="en-US" sz="2000" b="0" dirty="0" err="1" smtClean="0">
+                <a:latin typeface="Inconsolata"/>
+                <a:cs typeface="Inconsolata"/>
+              </a:rPr>
+              <a:t>zip(tuners</a:t>
+            </a:r>
+            <a:r>
+              <a:rPr lang="en-US" sz="2000" b="0" dirty="0" smtClean="0">
+                <a:latin typeface="Inconsolata"/>
+                <a:cs typeface="Inconsolata"/>
+              </a:rPr>
+              <a:t>, segments):</a:t>
+            </a:r>
+          </a:p>
+          <a:p>
+            <a:pPr algn="l"/>
+            <a:r>
+              <a:rPr lang="en-US" sz="2000" b="0" dirty="0" smtClean="0">
+                <a:latin typeface="Inconsolata"/>
+                <a:cs typeface="Inconsolata"/>
+              </a:rPr>
+              <a:t>    </a:t>
+            </a:r>
+            <a:r>
+              <a:rPr lang="en-US" sz="2000" b="0" dirty="0" err="1" smtClean="0">
+                <a:latin typeface="Inconsolata"/>
+                <a:cs typeface="Inconsolata"/>
+              </a:rPr>
+              <a:t>tune_val</a:t>
+            </a:r>
+            <a:r>
+              <a:rPr lang="en-US" sz="2000" b="0" dirty="0" smtClean="0">
+                <a:latin typeface="Inconsolata"/>
+                <a:cs typeface="Inconsolata"/>
+              </a:rPr>
+              <a:t> = </a:t>
+            </a:r>
+            <a:r>
+              <a:rPr lang="en-US" sz="2000" b="0" dirty="0" err="1" smtClean="0">
+                <a:latin typeface="Inconsolata"/>
+                <a:cs typeface="Inconsolata"/>
+              </a:rPr>
+              <a:t>tuner(deck</a:t>
+            </a:r>
+            <a:r>
+              <a:rPr lang="en-US" sz="2000" b="0" dirty="0" smtClean="0">
+                <a:latin typeface="Inconsolata"/>
+                <a:cs typeface="Inconsolata"/>
+              </a:rPr>
+              <a:t>, laser, </a:t>
+            </a:r>
+            <a:r>
+              <a:rPr lang="en-US" sz="2000" b="0" dirty="0" err="1" smtClean="0">
+                <a:latin typeface="Inconsolata"/>
+                <a:cs typeface="Inconsolata"/>
+              </a:rPr>
+              <a:t>seg</a:t>
+            </a:r>
+            <a:r>
+              <a:rPr lang="en-US" sz="2000" b="0" dirty="0" smtClean="0">
+                <a:latin typeface="Inconsolata"/>
+                <a:cs typeface="Inconsolata"/>
+              </a:rPr>
+              <a:t>)</a:t>
+            </a:r>
+          </a:p>
+          <a:p>
+            <a:pPr algn="l"/>
+            <a:r>
+              <a:rPr lang="en-US" sz="2000" b="0" dirty="0" smtClean="0">
+                <a:latin typeface="Inconsolata"/>
+                <a:cs typeface="Inconsolata"/>
+              </a:rPr>
+              <a:t>    </a:t>
+            </a:r>
+            <a:r>
+              <a:rPr lang="en-US" sz="2000" b="0" dirty="0" err="1" smtClean="0">
+                <a:latin typeface="Inconsolata"/>
+                <a:cs typeface="Inconsolata"/>
+              </a:rPr>
+              <a:t>setattr(laser</a:t>
+            </a:r>
+            <a:r>
+              <a:rPr lang="en-US" sz="2000" b="0" dirty="0" smtClean="0">
+                <a:latin typeface="Inconsolata"/>
+                <a:cs typeface="Inconsolata"/>
+              </a:rPr>
+              <a:t>, </a:t>
+            </a:r>
+            <a:r>
+              <a:rPr lang="en-US" sz="2000" b="0" dirty="0" err="1" smtClean="0">
+                <a:latin typeface="Inconsolata"/>
+                <a:cs typeface="Inconsolata"/>
+              </a:rPr>
+              <a:t>seg</a:t>
+            </a:r>
+            <a:r>
+              <a:rPr lang="en-US" sz="2000" b="0" dirty="0" smtClean="0">
+                <a:latin typeface="Inconsolata"/>
+                <a:cs typeface="Inconsolata"/>
+              </a:rPr>
+              <a:t>, </a:t>
+            </a:r>
+            <a:r>
+              <a:rPr lang="en-US" sz="2000" b="0" dirty="0" err="1" smtClean="0">
+                <a:latin typeface="Inconsolata"/>
+                <a:cs typeface="Inconsolata"/>
+              </a:rPr>
+              <a:t>tune_val</a:t>
+            </a:r>
+            <a:r>
+              <a:rPr lang="en-US" sz="2000" b="0" dirty="0" smtClean="0">
+                <a:latin typeface="Inconsolata"/>
+                <a:cs typeface="Inconsolata"/>
+              </a:rPr>
+              <a:t>)</a:t>
+            </a:r>
+          </a:p>
+        </p:txBody>
+      </p:sp>
+    </p:spTree>
+  </p:cSld>
+  <p:clrMapOvr>
+    <a:masterClrMapping/>
+  </p:clrMapOvr>
+  <p:timing>
+    <p:tnLst>
+      <p:par>
+        <p:cTn id="1" dur="indefinite" restart="never" nodeType="tmRoot"/>
+      </p:par>
+    </p:tnLst>
+  </p:timing>
+</p:sld>
+</file>
+
+<file path=ppt/slides/slide9.xml><?xml version="1.0" encoding="utf-8"?>
 <p:sld xmlns:a="http://schemas.openxmlformats.org/drawingml/2006/main" xmlns:r="http://schemas.openxmlformats.org/officeDocument/2006/relationships" xmlns:mc="http://schemas.openxmlformats.org/markup-compatibility/2006" xmlns:mv="urn:schemas-microsoft-com:mac:vml" xmlns:p="http://schemas.openxmlformats.org/presentationml/2006/main" mc:Ignorable="mv" mc:PreserveAttributes="mv:*">
   <p:cSld>
     <p:spTree>
@@ -10964,13 +12002,7 @@
               <a:rPr lang="en-US" dirty="0" smtClean="0">
                 <a:latin typeface="Helvetica" pitchFamily="-111" charset="0"/>
               </a:rPr>
-              <a:t>Input file </a:t>
-            </a:r>
-            <a:r>
-              <a:rPr lang="en-US" dirty="0" smtClean="0">
-                <a:latin typeface="Helvetica" pitchFamily="-111" charset="0"/>
-              </a:rPr>
-              <a:t>generation</a:t>
+              <a:t>Input file generation</a:t>
             </a:r>
           </a:p>
           <a:p>
@@ -11283,13 +12315,7 @@
               <a:rPr lang="en-US" dirty="0" smtClean="0">
                 <a:latin typeface="Helvetica" pitchFamily="-111" charset="0"/>
               </a:rPr>
-              <a:t>O</a:t>
-            </a:r>
-            <a:r>
-              <a:rPr lang="en-US" dirty="0" smtClean="0">
-                <a:latin typeface="Helvetica" pitchFamily="-111" charset="0"/>
-              </a:rPr>
-              <a:t>utput frequency control</a:t>
+              <a:t>Output frequency control</a:t>
             </a:r>
             <a:endParaRPr kumimoji="0" lang="en-US" sz="1800" b="1" i="0" u="none" strike="noStrike" cap="none" normalizeH="0" baseline="0" dirty="0">
               <a:ln>
@@ -11475,537 +12501,13 @@
   <p:clrMapOvr>
     <a:masterClrMapping/>
   </p:clrMapOvr>
-</p:sld>
-</file>
-
-<file path=ppt/slides/slide8.xml><?xml version="1.0" encoding="utf-8"?>
-<p:sld xmlns:a="http://schemas.openxmlformats.org/drawingml/2006/main" xmlns:r="http://schemas.openxmlformats.org/officeDocument/2006/relationships" xmlns:mc="http://schemas.openxmlformats.org/markup-compatibility/2006" xmlns:mv="urn:schemas-microsoft-com:mac:vml" xmlns:p="http://schemas.openxmlformats.org/presentationml/2006/main" mc:Ignorable="mv" mc:PreserveAttributes="mv:*">
-  <p:cSld>
-    <p:spTree>
-      <p:nvGrpSpPr>
-        <p:cNvPr id="1" name=""/>
-        <p:cNvGrpSpPr/>
-        <p:nvPr/>
-      </p:nvGrpSpPr>
-      <p:grpSpPr>
-        <a:xfrm>
-          <a:off x="0" y="0"/>
-          <a:ext cx="0" cy="0"/>
-          <a:chOff x="0" y="0"/>
-          <a:chExt cx="0" cy="0"/>
-        </a:xfrm>
-      </p:grpSpPr>
-      <p:sp>
-        <p:nvSpPr>
-          <p:cNvPr id="2" name="Title 1"/>
-          <p:cNvSpPr>
-            <a:spLocks noGrp="1"/>
-          </p:cNvSpPr>
-          <p:nvPr>
-            <p:ph type="title"/>
-          </p:nvPr>
-        </p:nvSpPr>
-        <p:spPr/>
-        <p:txBody>
-          <a:bodyPr/>
-          <a:lstStyle/>
-          <a:p>
-            <a:r>
-              <a:rPr lang="en-US" dirty="0" smtClean="0"/>
-              <a:t>Build a tuned pulse by appending optimized the pieces</a:t>
-            </a:r>
-            <a:endParaRPr lang="en-US" dirty="0"/>
-          </a:p>
-        </p:txBody>
-      </p:sp>
-      <p:sp>
-        <p:nvSpPr>
-          <p:cNvPr id="3" name="Content Placeholder 2"/>
-          <p:cNvSpPr>
-            <a:spLocks noGrp="1"/>
-          </p:cNvSpPr>
-          <p:nvPr>
-            <p:ph idx="1"/>
-          </p:nvPr>
-        </p:nvSpPr>
-        <p:spPr>
-          <a:xfrm>
-            <a:off x="212725" y="1233003"/>
-            <a:ext cx="8778875" cy="5053497"/>
-          </a:xfrm>
-        </p:spPr>
-        <p:txBody>
-          <a:bodyPr/>
-          <a:lstStyle/>
-          <a:p>
-            <a:r>
-              <a:rPr lang="en-US" dirty="0" smtClean="0"/>
-              <a:t>Pulse start times and powers must be adjusted to have the correct behavior</a:t>
-            </a:r>
-          </a:p>
-          <a:p>
-            <a:r>
-              <a:rPr lang="en-US" dirty="0" smtClean="0"/>
-              <a:t>Adjusting (“tuning”) by hand has high latency and is labor intensive</a:t>
-            </a:r>
-          </a:p>
-          <a:p>
-            <a:r>
-              <a:rPr lang="en-US" dirty="0" smtClean="0"/>
-              <a:t>We can construct objective functions that implement the “eye balling” heuristics that people use when manually tuning</a:t>
-            </a:r>
-          </a:p>
-          <a:p>
-            <a:r>
-              <a:rPr lang="en-US" dirty="0" smtClean="0"/>
-              <a:t>Construct a tuned pulse by appending tuned pieces</a:t>
-            </a:r>
-            <a:endParaRPr lang="en-US" dirty="0"/>
-          </a:p>
-        </p:txBody>
-      </p:sp>
-      <p:sp>
-        <p:nvSpPr>
-          <p:cNvPr id="4" name="TextBox 3"/>
-          <p:cNvSpPr txBox="1"/>
-          <p:nvPr/>
-        </p:nvSpPr>
-        <p:spPr>
-          <a:xfrm>
-            <a:off x="315104" y="3141360"/>
-            <a:ext cx="8670149" cy="1938992"/>
-          </a:xfrm>
-          <a:prstGeom prst="rect">
-            <a:avLst/>
-          </a:prstGeom>
-          <a:noFill/>
-        </p:spPr>
-        <p:txBody>
-          <a:bodyPr wrap="square" rtlCol="0">
-            <a:spAutoFit/>
-          </a:bodyPr>
-          <a:lstStyle/>
-          <a:p>
-            <a:pPr algn="l"/>
-            <a:r>
-              <a:rPr lang="en-US" sz="2000" b="0" dirty="0" smtClean="0">
-                <a:latin typeface="Inconsolata"/>
-                <a:cs typeface="Inconsolata"/>
-              </a:rPr>
-              <a:t>tuners = [</a:t>
-            </a:r>
-            <a:r>
-              <a:rPr lang="en-US" sz="2000" b="0" dirty="0" err="1" smtClean="0">
-                <a:latin typeface="Inconsolata"/>
-                <a:cs typeface="Inconsolata"/>
-              </a:rPr>
-              <a:t>shock_sync</a:t>
-            </a:r>
-            <a:r>
-              <a:rPr lang="en-US" sz="2000" b="0" dirty="0" smtClean="0">
-                <a:latin typeface="Inconsolata"/>
-                <a:cs typeface="Inconsolata"/>
-              </a:rPr>
-              <a:t>, </a:t>
-            </a:r>
-            <a:r>
-              <a:rPr lang="en-US" sz="2000" b="0" dirty="0" err="1" smtClean="0">
-                <a:latin typeface="Inconsolata"/>
-                <a:cs typeface="Inconsolata"/>
-              </a:rPr>
-              <a:t>shock_sync</a:t>
-            </a:r>
-            <a:r>
-              <a:rPr lang="en-US" sz="2000" b="0" dirty="0" smtClean="0">
-                <a:latin typeface="Inconsolata"/>
-                <a:cs typeface="Inconsolata"/>
-              </a:rPr>
-              <a:t>, </a:t>
-            </a:r>
-            <a:r>
-              <a:rPr lang="en-US" sz="2000" b="0" dirty="0" err="1" smtClean="0">
-                <a:latin typeface="Inconsolata"/>
-                <a:cs typeface="Inconsolata"/>
-              </a:rPr>
-              <a:t>shock_sync</a:t>
-            </a:r>
-            <a:r>
-              <a:rPr lang="en-US" sz="2000" b="0" dirty="0" smtClean="0">
-                <a:latin typeface="Inconsolata"/>
-                <a:cs typeface="Inconsolata"/>
-              </a:rPr>
-              <a:t>, </a:t>
-            </a:r>
-            <a:r>
-              <a:rPr lang="en-US" sz="2000" b="0" dirty="0" err="1" smtClean="0">
-                <a:latin typeface="Inconsolata"/>
-                <a:cs typeface="Inconsolata"/>
-              </a:rPr>
-              <a:t>max_rhor</a:t>
-            </a:r>
-            <a:r>
-              <a:rPr lang="en-US" sz="2000" b="0" dirty="0" smtClean="0">
-                <a:latin typeface="Inconsolata"/>
-                <a:cs typeface="Inconsolata"/>
-              </a:rPr>
-              <a:t>, </a:t>
-            </a:r>
-            <a:r>
-              <a:rPr lang="en-US" sz="2000" b="0" dirty="0" err="1" smtClean="0">
-                <a:latin typeface="Inconsolata"/>
-                <a:cs typeface="Inconsolata"/>
-              </a:rPr>
-              <a:t>max_yield</a:t>
-            </a:r>
-            <a:r>
-              <a:rPr lang="en-US" sz="2000" b="0" dirty="0" smtClean="0">
-                <a:latin typeface="Inconsolata"/>
-                <a:cs typeface="Inconsolata"/>
-              </a:rPr>
-              <a:t>]</a:t>
-            </a:r>
-          </a:p>
-          <a:p>
-            <a:pPr algn="l"/>
-            <a:r>
-              <a:rPr lang="en-US" sz="2000" b="0" dirty="0" smtClean="0">
-                <a:latin typeface="Inconsolata"/>
-                <a:cs typeface="Inconsolata"/>
-              </a:rPr>
-              <a:t>segments = [‘shock2’, ‘shock3’, ‘shock4’, ‘main’, ‘ignite’]</a:t>
-            </a:r>
-          </a:p>
-          <a:p>
-            <a:pPr algn="l"/>
-            <a:r>
-              <a:rPr lang="en-US" sz="2000" b="0" dirty="0" smtClean="0">
-                <a:latin typeface="Inconsolata"/>
-                <a:cs typeface="Inconsolata"/>
-              </a:rPr>
-              <a:t>laser = Laser()</a:t>
-            </a:r>
-          </a:p>
-          <a:p>
-            <a:pPr algn="l"/>
-            <a:r>
-              <a:rPr lang="en-US" sz="2000" b="0" dirty="0" smtClean="0">
-                <a:latin typeface="Inconsolata"/>
-                <a:cs typeface="Inconsolata"/>
-              </a:rPr>
-              <a:t>for tuner, </a:t>
-            </a:r>
-            <a:r>
-              <a:rPr lang="en-US" sz="2000" b="0" dirty="0" err="1" smtClean="0">
-                <a:latin typeface="Inconsolata"/>
-                <a:cs typeface="Inconsolata"/>
-              </a:rPr>
-              <a:t>seg</a:t>
-            </a:r>
-            <a:r>
-              <a:rPr lang="en-US" sz="2000" b="0" dirty="0" smtClean="0">
-                <a:latin typeface="Inconsolata"/>
-                <a:cs typeface="Inconsolata"/>
-              </a:rPr>
-              <a:t> in </a:t>
-            </a:r>
-            <a:r>
-              <a:rPr lang="en-US" sz="2000" b="0" dirty="0" err="1" smtClean="0">
-                <a:latin typeface="Inconsolata"/>
-                <a:cs typeface="Inconsolata"/>
-              </a:rPr>
-              <a:t>zip(tuners</a:t>
-            </a:r>
-            <a:r>
-              <a:rPr lang="en-US" sz="2000" b="0" dirty="0" smtClean="0">
-                <a:latin typeface="Inconsolata"/>
-                <a:cs typeface="Inconsolata"/>
-              </a:rPr>
-              <a:t>, segments):</a:t>
-            </a:r>
-          </a:p>
-          <a:p>
-            <a:pPr algn="l"/>
-            <a:r>
-              <a:rPr lang="en-US" sz="2000" b="0" dirty="0" smtClean="0">
-                <a:latin typeface="Inconsolata"/>
-                <a:cs typeface="Inconsolata"/>
-              </a:rPr>
-              <a:t>    </a:t>
-            </a:r>
-            <a:r>
-              <a:rPr lang="en-US" sz="2000" b="0" dirty="0" err="1" smtClean="0">
-                <a:latin typeface="Inconsolata"/>
-                <a:cs typeface="Inconsolata"/>
-              </a:rPr>
-              <a:t>tune_val</a:t>
-            </a:r>
-            <a:r>
-              <a:rPr lang="en-US" sz="2000" b="0" dirty="0" smtClean="0">
-                <a:latin typeface="Inconsolata"/>
-                <a:cs typeface="Inconsolata"/>
-              </a:rPr>
-              <a:t> = </a:t>
-            </a:r>
-            <a:r>
-              <a:rPr lang="en-US" sz="2000" b="0" dirty="0" err="1" smtClean="0">
-                <a:latin typeface="Inconsolata"/>
-                <a:cs typeface="Inconsolata"/>
-              </a:rPr>
-              <a:t>tuner(deck</a:t>
-            </a:r>
-            <a:r>
-              <a:rPr lang="en-US" sz="2000" b="0" dirty="0" smtClean="0">
-                <a:latin typeface="Inconsolata"/>
-                <a:cs typeface="Inconsolata"/>
-              </a:rPr>
-              <a:t>, laser, </a:t>
-            </a:r>
-            <a:r>
-              <a:rPr lang="en-US" sz="2000" b="0" dirty="0" err="1" smtClean="0">
-                <a:latin typeface="Inconsolata"/>
-                <a:cs typeface="Inconsolata"/>
-              </a:rPr>
-              <a:t>seg</a:t>
-            </a:r>
-            <a:r>
-              <a:rPr lang="en-US" sz="2000" b="0" dirty="0" smtClean="0">
-                <a:latin typeface="Inconsolata"/>
-                <a:cs typeface="Inconsolata"/>
-              </a:rPr>
-              <a:t>)</a:t>
-            </a:r>
-          </a:p>
-          <a:p>
-            <a:pPr algn="l"/>
-            <a:r>
-              <a:rPr lang="en-US" sz="2000" b="0" dirty="0" smtClean="0">
-                <a:latin typeface="Inconsolata"/>
-                <a:cs typeface="Inconsolata"/>
-              </a:rPr>
-              <a:t>    </a:t>
-            </a:r>
-            <a:r>
-              <a:rPr lang="en-US" sz="2000" b="0" dirty="0" err="1" smtClean="0">
-                <a:latin typeface="Inconsolata"/>
-                <a:cs typeface="Inconsolata"/>
-              </a:rPr>
-              <a:t>setattr(laser</a:t>
-            </a:r>
-            <a:r>
-              <a:rPr lang="en-US" sz="2000" b="0" dirty="0" smtClean="0">
-                <a:latin typeface="Inconsolata"/>
-                <a:cs typeface="Inconsolata"/>
-              </a:rPr>
-              <a:t>, </a:t>
-            </a:r>
-            <a:r>
-              <a:rPr lang="en-US" sz="2000" b="0" dirty="0" err="1" smtClean="0">
-                <a:latin typeface="Inconsolata"/>
-                <a:cs typeface="Inconsolata"/>
-              </a:rPr>
-              <a:t>seg</a:t>
-            </a:r>
-            <a:r>
-              <a:rPr lang="en-US" sz="2000" b="0" dirty="0" smtClean="0">
-                <a:latin typeface="Inconsolata"/>
-                <a:cs typeface="Inconsolata"/>
-              </a:rPr>
-              <a:t>, </a:t>
-            </a:r>
-            <a:r>
-              <a:rPr lang="en-US" sz="2000" b="0" dirty="0" err="1" smtClean="0">
-                <a:latin typeface="Inconsolata"/>
-                <a:cs typeface="Inconsolata"/>
-              </a:rPr>
-              <a:t>tune_val</a:t>
-            </a:r>
-            <a:r>
-              <a:rPr lang="en-US" sz="2000" b="0" dirty="0" smtClean="0">
-                <a:latin typeface="Inconsolata"/>
-                <a:cs typeface="Inconsolata"/>
-              </a:rPr>
-              <a:t>)</a:t>
-            </a:r>
-          </a:p>
-        </p:txBody>
-      </p:sp>
-    </p:spTree>
-  </p:cSld>
-  <p:clrMapOvr>
-    <a:masterClrMapping/>
-  </p:clrMapOvr>
-</p:sld>
-</file>
-
-<file path=ppt/slides/slide9.xml><?xml version="1.0" encoding="utf-8"?>
-<p:sld xmlns:a="http://schemas.openxmlformats.org/drawingml/2006/main" xmlns:r="http://schemas.openxmlformats.org/officeDocument/2006/relationships" xmlns:mc="http://schemas.openxmlformats.org/markup-compatibility/2006" xmlns:mv="urn:schemas-microsoft-com:mac:vml" xmlns:p="http://schemas.openxmlformats.org/presentationml/2006/main" mc:Ignorable="mv" mc:PreserveAttributes="mv:*">
-  <p:cSld>
-    <p:spTree>
-      <p:nvGrpSpPr>
-        <p:cNvPr id="1" name=""/>
-        <p:cNvGrpSpPr/>
-        <p:nvPr/>
-      </p:nvGrpSpPr>
-      <p:grpSpPr>
-        <a:xfrm>
-          <a:off x="0" y="0"/>
-          <a:ext cx="0" cy="0"/>
-          <a:chOff x="0" y="0"/>
-          <a:chExt cx="0" cy="0"/>
-        </a:xfrm>
-      </p:grpSpPr>
-      <p:sp>
-        <p:nvSpPr>
-          <p:cNvPr id="2" name="Title 1"/>
-          <p:cNvSpPr>
-            <a:spLocks noGrp="1"/>
-          </p:cNvSpPr>
-          <p:nvPr>
-            <p:ph type="title"/>
-          </p:nvPr>
-        </p:nvSpPr>
-        <p:spPr/>
-        <p:txBody>
-          <a:bodyPr/>
-          <a:lstStyle/>
-          <a:p>
-            <a:r>
-              <a:rPr lang="en-US" dirty="0" smtClean="0"/>
-              <a:t>Auto-tuner needs to generate, run and process many </a:t>
-            </a:r>
-            <a:r>
-              <a:rPr lang="en-US" dirty="0" err="1" smtClean="0"/>
-              <a:t>simultions</a:t>
-            </a:r>
-            <a:endParaRPr lang="en-US" dirty="0"/>
-          </a:p>
-        </p:txBody>
-      </p:sp>
-      <p:sp>
-        <p:nvSpPr>
-          <p:cNvPr id="3" name="Content Placeholder 2"/>
-          <p:cNvSpPr>
-            <a:spLocks noGrp="1"/>
-          </p:cNvSpPr>
-          <p:nvPr>
-            <p:ph idx="1"/>
-          </p:nvPr>
-        </p:nvSpPr>
-        <p:spPr>
-          <a:xfrm>
-            <a:off x="212725" y="1231719"/>
-            <a:ext cx="8778875" cy="5054781"/>
-          </a:xfrm>
-        </p:spPr>
-        <p:txBody>
-          <a:bodyPr/>
-          <a:lstStyle/>
-          <a:p>
-            <a:r>
-              <a:rPr lang="en-US" dirty="0" smtClean="0"/>
-              <a:t>Input file generators that wrap a “template” input file</a:t>
-            </a:r>
-          </a:p>
-          <a:p>
-            <a:pPr lvl="1"/>
-            <a:r>
-              <a:rPr lang="en-US" dirty="0" smtClean="0"/>
-              <a:t>Modify simple Hydra variable assignments</a:t>
-            </a:r>
-          </a:p>
-          <a:p>
-            <a:pPr lvl="1"/>
-            <a:r>
-              <a:rPr lang="en-US" dirty="0" smtClean="0"/>
-              <a:t>Delegate complicated input file structures to special purpose objects</a:t>
-            </a:r>
-          </a:p>
-          <a:p>
-            <a:pPr lvl="1"/>
-            <a:r>
-              <a:rPr lang="en-US" dirty="0" smtClean="0"/>
-              <a:t>Inject commands into the input file by </a:t>
-            </a:r>
-            <a:r>
-              <a:rPr lang="en-US" dirty="0" err="1" smtClean="0"/>
-              <a:t>overwritings</a:t>
-            </a:r>
-            <a:r>
-              <a:rPr lang="en-US" dirty="0" smtClean="0"/>
-              <a:t> sentinels with </a:t>
-            </a:r>
-            <a:br>
-              <a:rPr lang="en-US" dirty="0" smtClean="0"/>
-            </a:br>
-            <a:r>
-              <a:rPr lang="en-US" dirty="0" smtClean="0">
-                <a:latin typeface="Inconsolata"/>
-                <a:cs typeface="Inconsolata"/>
-              </a:rPr>
-              <a:t>	</a:t>
-            </a:r>
-            <a:r>
-              <a:rPr lang="en-US" dirty="0" err="1" smtClean="0">
-                <a:latin typeface="Inconsolata"/>
-                <a:cs typeface="Inconsolata"/>
-              </a:rPr>
-              <a:t>str(python_proxy_of_complicated_thing</a:t>
-            </a:r>
-            <a:r>
-              <a:rPr lang="en-US" dirty="0" smtClean="0">
-                <a:latin typeface="Inconsolata"/>
-                <a:cs typeface="Inconsolata"/>
-              </a:rPr>
-              <a:t>)</a:t>
-            </a:r>
-          </a:p>
-          <a:p>
-            <a:pPr lvl="1"/>
-            <a:endParaRPr lang="en-US" dirty="0" smtClean="0"/>
-          </a:p>
-          <a:p>
-            <a:r>
-              <a:rPr lang="en-US" dirty="0" smtClean="0"/>
-              <a:t>Output file wrappers extract data from Hydra binary output files</a:t>
-            </a:r>
-          </a:p>
-          <a:p>
-            <a:endParaRPr lang="en-US" dirty="0" smtClean="0"/>
-          </a:p>
-          <a:p>
-            <a:r>
-              <a:rPr lang="en-US" dirty="0" smtClean="0"/>
-              <a:t>Embedded diagnostics using embedded Python interpreter</a:t>
-            </a:r>
-          </a:p>
-          <a:p>
-            <a:pPr lvl="1"/>
-            <a:r>
-              <a:rPr lang="en-US" dirty="0" smtClean="0"/>
-              <a:t>Characteristic (shock) trackers with finish line triggers</a:t>
-            </a:r>
-          </a:p>
-          <a:p>
-            <a:pPr lvl="1"/>
-            <a:r>
-              <a:rPr lang="en-US" dirty="0" smtClean="0"/>
-              <a:t>Change graphics dump frequency based on shock locations</a:t>
-            </a:r>
-          </a:p>
-          <a:p>
-            <a:pPr lvl="1"/>
-            <a:r>
-              <a:rPr lang="en-US" dirty="0" smtClean="0"/>
-              <a:t>ρR monitors</a:t>
-            </a:r>
-          </a:p>
-        </p:txBody>
-      </p:sp>
-    </p:spTree>
-  </p:cSld>
-  <p:clrMapOvr>
-    <a:masterClrMapping/>
-  </p:clrMapOvr>
+  <p:timing>
+    <p:tnLst>
+      <p:par>
+        <p:cTn id="1" dur="indefinite" restart="never" nodeType="tmRoot"/>
+      </p:par>
+    </p:tnLst>
+  </p:timing>
 </p:sld>
 </file>
 

</xml_diff>